<commit_message>
240830 SpotApi db저장 완료 및 update ignore
ignore application properties 사용해서 api key 감추기
</commit_message>
<xml_diff>
--- a/doc/장소추천(박선우)/화면설계서_박선우.pptx
+++ b/doc/장소추천(박선우)/화면설계서_박선우.pptx
@@ -261,7 +261,7 @@
           <a:p>
             <a:fld id="{E45CB7D9-AD29-4501-91ED-FB754C8111DA}" type="datetimeFigureOut">
               <a:rPr lang="ko-KR" altLang="en-US" smtClean="0"/>
-              <a:t>2024-08-23</a:t>
+              <a:t>2024-08-29</a:t>
             </a:fld>
             <a:endParaRPr lang="ko-KR" altLang="en-US"/>
           </a:p>
@@ -459,7 +459,7 @@
           <a:p>
             <a:fld id="{E45CB7D9-AD29-4501-91ED-FB754C8111DA}" type="datetimeFigureOut">
               <a:rPr lang="ko-KR" altLang="en-US" smtClean="0"/>
-              <a:t>2024-08-23</a:t>
+              <a:t>2024-08-29</a:t>
             </a:fld>
             <a:endParaRPr lang="ko-KR" altLang="en-US"/>
           </a:p>
@@ -667,7 +667,7 @@
           <a:p>
             <a:fld id="{E45CB7D9-AD29-4501-91ED-FB754C8111DA}" type="datetimeFigureOut">
               <a:rPr lang="ko-KR" altLang="en-US" smtClean="0"/>
-              <a:t>2024-08-23</a:t>
+              <a:t>2024-08-29</a:t>
             </a:fld>
             <a:endParaRPr lang="ko-KR" altLang="en-US"/>
           </a:p>
@@ -865,7 +865,7 @@
           <a:p>
             <a:fld id="{E45CB7D9-AD29-4501-91ED-FB754C8111DA}" type="datetimeFigureOut">
               <a:rPr lang="ko-KR" altLang="en-US" smtClean="0"/>
-              <a:t>2024-08-23</a:t>
+              <a:t>2024-08-29</a:t>
             </a:fld>
             <a:endParaRPr lang="ko-KR" altLang="en-US"/>
           </a:p>
@@ -1140,7 +1140,7 @@
           <a:p>
             <a:fld id="{E45CB7D9-AD29-4501-91ED-FB754C8111DA}" type="datetimeFigureOut">
               <a:rPr lang="ko-KR" altLang="en-US" smtClean="0"/>
-              <a:t>2024-08-23</a:t>
+              <a:t>2024-08-29</a:t>
             </a:fld>
             <a:endParaRPr lang="ko-KR" altLang="en-US"/>
           </a:p>
@@ -1405,7 +1405,7 @@
           <a:p>
             <a:fld id="{E45CB7D9-AD29-4501-91ED-FB754C8111DA}" type="datetimeFigureOut">
               <a:rPr lang="ko-KR" altLang="en-US" smtClean="0"/>
-              <a:t>2024-08-23</a:t>
+              <a:t>2024-08-29</a:t>
             </a:fld>
             <a:endParaRPr lang="ko-KR" altLang="en-US"/>
           </a:p>
@@ -1817,7 +1817,7 @@
           <a:p>
             <a:fld id="{E45CB7D9-AD29-4501-91ED-FB754C8111DA}" type="datetimeFigureOut">
               <a:rPr lang="ko-KR" altLang="en-US" smtClean="0"/>
-              <a:t>2024-08-23</a:t>
+              <a:t>2024-08-29</a:t>
             </a:fld>
             <a:endParaRPr lang="ko-KR" altLang="en-US"/>
           </a:p>
@@ -1958,7 +1958,7 @@
           <a:p>
             <a:fld id="{E45CB7D9-AD29-4501-91ED-FB754C8111DA}" type="datetimeFigureOut">
               <a:rPr lang="ko-KR" altLang="en-US" smtClean="0"/>
-              <a:t>2024-08-23</a:t>
+              <a:t>2024-08-29</a:t>
             </a:fld>
             <a:endParaRPr lang="ko-KR" altLang="en-US"/>
           </a:p>
@@ -2071,7 +2071,7 @@
           <a:p>
             <a:fld id="{E45CB7D9-AD29-4501-91ED-FB754C8111DA}" type="datetimeFigureOut">
               <a:rPr lang="ko-KR" altLang="en-US" smtClean="0"/>
-              <a:t>2024-08-23</a:t>
+              <a:t>2024-08-29</a:t>
             </a:fld>
             <a:endParaRPr lang="ko-KR" altLang="en-US"/>
           </a:p>
@@ -2382,7 +2382,7 @@
           <a:p>
             <a:fld id="{E45CB7D9-AD29-4501-91ED-FB754C8111DA}" type="datetimeFigureOut">
               <a:rPr lang="ko-KR" altLang="en-US" smtClean="0"/>
-              <a:t>2024-08-23</a:t>
+              <a:t>2024-08-29</a:t>
             </a:fld>
             <a:endParaRPr lang="ko-KR" altLang="en-US"/>
           </a:p>
@@ -2670,7 +2670,7 @@
           <a:p>
             <a:fld id="{E45CB7D9-AD29-4501-91ED-FB754C8111DA}" type="datetimeFigureOut">
               <a:rPr lang="ko-KR" altLang="en-US" smtClean="0"/>
-              <a:t>2024-08-23</a:t>
+              <a:t>2024-08-29</a:t>
             </a:fld>
             <a:endParaRPr lang="ko-KR" altLang="en-US"/>
           </a:p>
@@ -2911,7 +2911,7 @@
           <a:p>
             <a:fld id="{E45CB7D9-AD29-4501-91ED-FB754C8111DA}" type="datetimeFigureOut">
               <a:rPr lang="ko-KR" altLang="en-US" smtClean="0"/>
-              <a:t>2024-08-23</a:t>
+              <a:t>2024-08-29</a:t>
             </a:fld>
             <a:endParaRPr lang="ko-KR" altLang="en-US"/>
           </a:p>
@@ -3521,7 +3521,7 @@
         </p:nvSpPr>
         <p:spPr>
           <a:xfrm>
-            <a:off x="-1" y="1025713"/>
+            <a:off x="43752" y="984769"/>
             <a:ext cx="10536965" cy="5685934"/>
           </a:xfrm>
           <a:prstGeom prst="rect">
@@ -3574,7 +3574,7 @@
         </p:nvSpPr>
         <p:spPr>
           <a:xfrm>
-            <a:off x="3750127" y="987589"/>
+            <a:off x="4275778" y="855350"/>
             <a:ext cx="1680672" cy="761696"/>
           </a:xfrm>
         </p:spPr>
@@ -3592,47 +3592,6 @@
               <a:rPr lang="en-US" altLang="ko-KR" sz="1800" dirty="0"/>
             </a:br>
             <a:endParaRPr lang="ko-KR" altLang="en-US" sz="1800" dirty="0"/>
-          </a:p>
-        </p:txBody>
-      </p:sp>
-      <p:sp>
-        <p:nvSpPr>
-          <p:cNvPr id="6" name="TextBox 5">
-            <a:extLst>
-              <a:ext uri="{FF2B5EF4-FFF2-40B4-BE49-F238E27FC236}">
-                <a16:creationId xmlns:a16="http://schemas.microsoft.com/office/drawing/2014/main" id="{EE19AA97-1D11-46B1-BB34-FC7AA15FBA93}"/>
-              </a:ext>
-            </a:extLst>
-          </p:cNvPr>
-          <p:cNvSpPr txBox="1"/>
-          <p:nvPr/>
-        </p:nvSpPr>
-        <p:spPr>
-          <a:xfrm>
-            <a:off x="1681151" y="1637162"/>
-            <a:ext cx="5289846" cy="369332"/>
-          </a:xfrm>
-          <a:prstGeom prst="rect">
-            <a:avLst/>
-          </a:prstGeom>
-          <a:solidFill>
-            <a:schemeClr val="bg1">
-              <a:lumMod val="85000"/>
-            </a:schemeClr>
-          </a:solidFill>
-        </p:spPr>
-        <p:txBody>
-          <a:bodyPr wrap="square" rtlCol="0">
-            <a:spAutoFit/>
-          </a:bodyPr>
-          <a:lstStyle/>
-          <a:p>
-            <a:pPr algn="ctr"/>
-            <a:r>
-              <a:rPr lang="ko-KR" altLang="en-US" dirty="0" err="1"/>
-              <a:t>검색창</a:t>
-            </a:r>
-            <a:endParaRPr lang="en-US" altLang="ko-KR" dirty="0"/>
           </a:p>
         </p:txBody>
       </p:sp>
@@ -3702,64 +3661,6 @@
                 <a:schemeClr val="tx1"/>
               </a:solidFill>
             </a:endParaRPr>
-          </a:p>
-        </p:txBody>
-      </p:sp>
-      <p:sp>
-        <p:nvSpPr>
-          <p:cNvPr id="13" name="타원 12">
-            <a:extLst>
-              <a:ext uri="{FF2B5EF4-FFF2-40B4-BE49-F238E27FC236}">
-                <a16:creationId xmlns:a16="http://schemas.microsoft.com/office/drawing/2014/main" id="{9840255C-769E-4D42-BD08-00492C04FC73}"/>
-              </a:ext>
-            </a:extLst>
-          </p:cNvPr>
-          <p:cNvSpPr/>
-          <p:nvPr/>
-        </p:nvSpPr>
-        <p:spPr>
-          <a:xfrm>
-            <a:off x="7230582" y="1664408"/>
-            <a:ext cx="538386" cy="260835"/>
-          </a:xfrm>
-          <a:prstGeom prst="ellipse">
-            <a:avLst/>
-          </a:prstGeom>
-          <a:solidFill>
-            <a:schemeClr val="bg1">
-              <a:lumMod val="85000"/>
-            </a:schemeClr>
-          </a:solidFill>
-        </p:spPr>
-        <p:style>
-          <a:lnRef idx="2">
-            <a:schemeClr val="accent1">
-              <a:shade val="50000"/>
-            </a:schemeClr>
-          </a:lnRef>
-          <a:fillRef idx="1">
-            <a:schemeClr val="accent1"/>
-          </a:fillRef>
-          <a:effectRef idx="0">
-            <a:schemeClr val="accent1"/>
-          </a:effectRef>
-          <a:fontRef idx="minor">
-            <a:schemeClr val="lt1"/>
-          </a:fontRef>
-        </p:style>
-        <p:txBody>
-          <a:bodyPr rtlCol="0" anchor="ctr"/>
-          <a:lstStyle/>
-          <a:p>
-            <a:pPr algn="ctr"/>
-            <a:r>
-              <a:rPr lang="ko-KR" altLang="en-US" sz="1000" dirty="0">
-                <a:solidFill>
-                  <a:schemeClr val="tx1"/>
-                </a:solidFill>
-              </a:rPr>
-              <a:t>검색</a:t>
-            </a:r>
           </a:p>
         </p:txBody>
       </p:sp>
@@ -3813,14 +3714,11 @@
           <a:lstStyle/>
           <a:p>
             <a:pPr algn="ctr"/>
-            <a:r>
-              <a:rPr lang="ko-KR" altLang="en-US" dirty="0">
-                <a:solidFill>
-                  <a:schemeClr val="tx1"/>
-                </a:solidFill>
-              </a:rPr>
-              <a:t>서울</a:t>
-            </a:r>
+            <a:endParaRPr lang="ko-KR" altLang="en-US" dirty="0">
+              <a:solidFill>
+                <a:schemeClr val="tx1"/>
+              </a:solidFill>
+            </a:endParaRPr>
           </a:p>
         </p:txBody>
       </p:sp>
@@ -3838,8 +3736,8 @@
         </p:nvSpPr>
         <p:spPr>
           <a:xfrm>
-            <a:off x="1090261" y="2713068"/>
-            <a:ext cx="8655461" cy="1410056"/>
+            <a:off x="1055560" y="1407712"/>
+            <a:ext cx="9294250" cy="4885022"/>
           </a:xfrm>
           <a:prstGeom prst="rect">
             <a:avLst/>
@@ -3889,7 +3787,7 @@
         </p:nvCxnSpPr>
         <p:spPr>
           <a:xfrm flipH="1">
-            <a:off x="3187908" y="4493618"/>
+            <a:off x="4779594" y="6472709"/>
             <a:ext cx="572567" cy="0"/>
           </a:xfrm>
           <a:prstGeom prst="straightConnector1">
@@ -3930,7 +3828,7 @@
         </p:nvCxnSpPr>
         <p:spPr>
           <a:xfrm rot="10800000" flipH="1">
-            <a:off x="5856167" y="4493618"/>
+            <a:off x="5787455" y="6481718"/>
             <a:ext cx="572567" cy="0"/>
           </a:xfrm>
           <a:prstGeom prst="straightConnector1">
@@ -3970,7 +3868,7 @@
         </p:nvSpPr>
         <p:spPr>
           <a:xfrm>
-            <a:off x="2166660" y="2876622"/>
+            <a:off x="2257018" y="3049009"/>
             <a:ext cx="1288991" cy="828811"/>
           </a:xfrm>
           <a:prstGeom prst="ellipse">
@@ -4007,7 +3905,7 @@
                   <a:schemeClr val="tx1"/>
                 </a:solidFill>
               </a:rPr>
-              <a:t>서울 지역 사진</a:t>
+              <a:t>지역 사진</a:t>
             </a:r>
             <a:r>
               <a:rPr lang="en-US" altLang="ko-KR" dirty="0">
@@ -4034,7 +3932,7 @@
         </p:nvSpPr>
         <p:spPr>
           <a:xfrm>
-            <a:off x="4807110" y="2923965"/>
+            <a:off x="4498464" y="2168807"/>
             <a:ext cx="1288991" cy="828811"/>
           </a:xfrm>
           <a:prstGeom prst="ellipse">
@@ -4071,7 +3969,7 @@
                   <a:schemeClr val="tx1"/>
                 </a:solidFill>
               </a:rPr>
-              <a:t>서울 지역 사진</a:t>
+              <a:t>지역 사진</a:t>
             </a:r>
             <a:r>
               <a:rPr lang="en-US" altLang="ko-KR" dirty="0">
@@ -4098,7 +3996,7 @@
         </p:nvSpPr>
         <p:spPr>
           <a:xfrm>
-            <a:off x="7894276" y="2825533"/>
+            <a:off x="7023882" y="3003422"/>
             <a:ext cx="1288990" cy="895540"/>
           </a:xfrm>
           <a:prstGeom prst="ellipse">
@@ -4135,7 +4033,7 @@
                   <a:schemeClr val="tx1"/>
                 </a:solidFill>
               </a:rPr>
-              <a:t>서울 지역 사진</a:t>
+              <a:t>지역 사진</a:t>
             </a:r>
             <a:r>
               <a:rPr lang="en-US" altLang="ko-KR" dirty="0">
@@ -4162,7 +4060,7 @@
         </p:nvSpPr>
         <p:spPr>
           <a:xfrm>
-            <a:off x="9444473" y="4287248"/>
+            <a:off x="9286114" y="5865472"/>
             <a:ext cx="940038" cy="333259"/>
           </a:xfrm>
           <a:prstGeom prst="rect">
@@ -4272,22 +4170,6 @@
           <a:lstStyle/>
           <a:p>
             <a:pPr algn="ctr"/>
-            <a:r>
-              <a:rPr lang="ko-KR" altLang="en-US" dirty="0">
-                <a:solidFill>
-                  <a:schemeClr val="tx1"/>
-                </a:solidFill>
-              </a:rPr>
-              <a:t>경인</a:t>
-            </a:r>
-            <a:endParaRPr lang="en-US" altLang="ko-KR" dirty="0">
-              <a:solidFill>
-                <a:schemeClr val="tx1"/>
-              </a:solidFill>
-            </a:endParaRPr>
-          </a:p>
-          <a:p>
-            <a:pPr algn="ctr"/>
             <a:endParaRPr lang="ko-KR" altLang="en-US" dirty="0">
               <a:solidFill>
                 <a:schemeClr val="tx1"/>
@@ -4298,10 +4180,10 @@
       </p:sp>
       <p:sp>
         <p:nvSpPr>
-          <p:cNvPr id="31" name="직사각형 30">
-            <a:extLst>
-              <a:ext uri="{FF2B5EF4-FFF2-40B4-BE49-F238E27FC236}">
-                <a16:creationId xmlns:a16="http://schemas.microsoft.com/office/drawing/2014/main" id="{8B3C9BE9-8C15-4D28-8F90-1A6B42C9F410}"/>
+          <p:cNvPr id="32" name="타원 31">
+            <a:extLst>
+              <a:ext uri="{FF2B5EF4-FFF2-40B4-BE49-F238E27FC236}">
+                <a16:creationId xmlns:a16="http://schemas.microsoft.com/office/drawing/2014/main" id="{BFC38C78-CC83-4574-B495-392CF05889EE}"/>
               </a:ext>
             </a:extLst>
           </p:cNvPr>
@@ -4310,56 +4192,7 @@
         </p:nvSpPr>
         <p:spPr>
           <a:xfrm>
-            <a:off x="1108465" y="5189811"/>
-            <a:ext cx="8655461" cy="1410056"/>
-          </a:xfrm>
-          <a:prstGeom prst="rect">
-            <a:avLst/>
-          </a:prstGeom>
-          <a:solidFill>
-            <a:schemeClr val="bg1"/>
-          </a:solidFill>
-        </p:spPr>
-        <p:style>
-          <a:lnRef idx="2">
-            <a:schemeClr val="accent1">
-              <a:shade val="50000"/>
-            </a:schemeClr>
-          </a:lnRef>
-          <a:fillRef idx="1">
-            <a:schemeClr val="accent1"/>
-          </a:fillRef>
-          <a:effectRef idx="0">
-            <a:schemeClr val="accent1"/>
-          </a:effectRef>
-          <a:fontRef idx="minor">
-            <a:schemeClr val="lt1"/>
-          </a:fontRef>
-        </p:style>
-        <p:txBody>
-          <a:bodyPr rtlCol="0" anchor="ctr"/>
-          <a:lstStyle/>
-          <a:p>
-            <a:pPr algn="ctr"/>
-            <a:endParaRPr lang="ko-KR" altLang="en-US"/>
-          </a:p>
-        </p:txBody>
-      </p:sp>
-      <p:sp>
-        <p:nvSpPr>
-          <p:cNvPr id="32" name="타원 31">
-            <a:extLst>
-              <a:ext uri="{FF2B5EF4-FFF2-40B4-BE49-F238E27FC236}">
-                <a16:creationId xmlns:a16="http://schemas.microsoft.com/office/drawing/2014/main" id="{BFC38C78-CC83-4574-B495-392CF05889EE}"/>
-              </a:ext>
-            </a:extLst>
-          </p:cNvPr>
-          <p:cNvSpPr/>
-          <p:nvPr/>
-        </p:nvSpPr>
-        <p:spPr>
-          <a:xfrm>
-            <a:off x="2332946" y="5554695"/>
+            <a:off x="3535054" y="4785115"/>
             <a:ext cx="1219058" cy="775562"/>
           </a:xfrm>
           <a:prstGeom prst="ellipse">
@@ -4396,7 +4229,7 @@
                   <a:schemeClr val="tx1"/>
                 </a:solidFill>
               </a:rPr>
-              <a:t>경인 지역 사진</a:t>
+              <a:t>지역 사진</a:t>
             </a:r>
             <a:r>
               <a:rPr lang="en-US" altLang="ko-KR" dirty="0">
@@ -4411,10 +4244,10 @@
       </p:sp>
       <p:sp>
         <p:nvSpPr>
-          <p:cNvPr id="33" name="타원 32">
-            <a:extLst>
-              <a:ext uri="{FF2B5EF4-FFF2-40B4-BE49-F238E27FC236}">
-                <a16:creationId xmlns:a16="http://schemas.microsoft.com/office/drawing/2014/main" id="{8334F849-6EBA-4DE3-AE91-A90E50FDEB8F}"/>
+          <p:cNvPr id="34" name="타원 33">
+            <a:extLst>
+              <a:ext uri="{FF2B5EF4-FFF2-40B4-BE49-F238E27FC236}">
+                <a16:creationId xmlns:a16="http://schemas.microsoft.com/office/drawing/2014/main" id="{173B1D45-510D-476C-A815-5318CB9996B1}"/>
               </a:ext>
             </a:extLst>
           </p:cNvPr>
@@ -4423,71 +4256,7 @@
         </p:nvSpPr>
         <p:spPr>
           <a:xfrm>
-            <a:off x="5031835" y="5499883"/>
-            <a:ext cx="1285481" cy="828811"/>
-          </a:xfrm>
-          <a:prstGeom prst="ellipse">
-            <a:avLst/>
-          </a:prstGeom>
-          <a:solidFill>
-            <a:schemeClr val="bg1"/>
-          </a:solidFill>
-        </p:spPr>
-        <p:style>
-          <a:lnRef idx="2">
-            <a:schemeClr val="accent1">
-              <a:shade val="50000"/>
-            </a:schemeClr>
-          </a:lnRef>
-          <a:fillRef idx="1">
-            <a:schemeClr val="accent1"/>
-          </a:fillRef>
-          <a:effectRef idx="0">
-            <a:schemeClr val="accent1"/>
-          </a:effectRef>
-          <a:fontRef idx="minor">
-            <a:schemeClr val="lt1"/>
-          </a:fontRef>
-        </p:style>
-        <p:txBody>
-          <a:bodyPr rtlCol="0" anchor="ctr"/>
-          <a:lstStyle/>
-          <a:p>
-            <a:pPr algn="ctr"/>
-            <a:r>
-              <a:rPr lang="ko-KR" altLang="en-US" dirty="0">
-                <a:solidFill>
-                  <a:schemeClr val="tx1"/>
-                </a:solidFill>
-              </a:rPr>
-              <a:t>경인 지역 사진</a:t>
-            </a:r>
-            <a:r>
-              <a:rPr lang="en-US" altLang="ko-KR" dirty="0">
-                <a:solidFill>
-                  <a:schemeClr val="tx1"/>
-                </a:solidFill>
-              </a:rPr>
-              <a:t>2</a:t>
-            </a:r>
-          </a:p>
-        </p:txBody>
-      </p:sp>
-      <p:sp>
-        <p:nvSpPr>
-          <p:cNvPr id="34" name="타원 33">
-            <a:extLst>
-              <a:ext uri="{FF2B5EF4-FFF2-40B4-BE49-F238E27FC236}">
-                <a16:creationId xmlns:a16="http://schemas.microsoft.com/office/drawing/2014/main" id="{173B1D45-510D-476C-A815-5318CB9996B1}"/>
-              </a:ext>
-            </a:extLst>
-          </p:cNvPr>
-          <p:cNvSpPr/>
-          <p:nvPr/>
-        </p:nvSpPr>
-        <p:spPr>
-          <a:xfrm>
-            <a:off x="8023175" y="5443219"/>
+            <a:off x="6096000" y="4690897"/>
             <a:ext cx="1224900" cy="900132"/>
           </a:xfrm>
           <a:prstGeom prst="ellipse">
@@ -4524,7 +4293,7 @@
                   <a:schemeClr val="tx1"/>
                 </a:solidFill>
               </a:rPr>
-              <a:t>경인 지역 사진</a:t>
+              <a:t>지역 사진</a:t>
             </a:r>
             <a:r>
               <a:rPr lang="en-US" altLang="ko-KR" dirty="0">
@@ -4757,53 +4526,12 @@
           </a:graphicData>
         </a:graphic>
       </p:graphicFrame>
-      <p:cxnSp>
-        <p:nvCxnSpPr>
-          <p:cNvPr id="4" name="직선 화살표 연결선 3">
-            <a:extLst>
-              <a:ext uri="{FF2B5EF4-FFF2-40B4-BE49-F238E27FC236}">
-                <a16:creationId xmlns:a16="http://schemas.microsoft.com/office/drawing/2014/main" id="{B06E69B3-E70D-480D-94FA-3CF486959A4C}"/>
-              </a:ext>
-            </a:extLst>
-          </p:cNvPr>
-          <p:cNvCxnSpPr>
-            <a:cxnSpLocks/>
-          </p:cNvCxnSpPr>
-          <p:nvPr/>
-        </p:nvCxnSpPr>
-        <p:spPr>
-          <a:xfrm flipH="1">
-            <a:off x="9190848" y="4485089"/>
-            <a:ext cx="447236" cy="224204"/>
-          </a:xfrm>
-          <a:prstGeom prst="straightConnector1">
-            <a:avLst/>
-          </a:prstGeom>
-          <a:ln>
-            <a:tailEnd type="triangle"/>
-          </a:ln>
-        </p:spPr>
-        <p:style>
-          <a:lnRef idx="1">
-            <a:schemeClr val="accent1"/>
-          </a:lnRef>
-          <a:fillRef idx="0">
-            <a:schemeClr val="accent1"/>
-          </a:fillRef>
-          <a:effectRef idx="0">
-            <a:schemeClr val="accent1"/>
-          </a:effectRef>
-          <a:fontRef idx="minor">
-            <a:schemeClr val="tx1"/>
-          </a:fontRef>
-        </p:style>
-      </p:cxnSp>
-      <p:sp>
-        <p:nvSpPr>
-          <p:cNvPr id="7" name="직사각형 6">
-            <a:extLst>
-              <a:ext uri="{FF2B5EF4-FFF2-40B4-BE49-F238E27FC236}">
-                <a16:creationId xmlns:a16="http://schemas.microsoft.com/office/drawing/2014/main" id="{61B8C0A0-3210-460F-AD43-5FA763F3524A}"/>
+      <p:sp>
+        <p:nvSpPr>
+          <p:cNvPr id="16" name="직사각형 15">
+            <a:extLst>
+              <a:ext uri="{FF2B5EF4-FFF2-40B4-BE49-F238E27FC236}">
+                <a16:creationId xmlns:a16="http://schemas.microsoft.com/office/drawing/2014/main" id="{16BB8D15-F27A-4640-B998-3609B66409EA}"/>
               </a:ext>
             </a:extLst>
           </p:cNvPr>
@@ -4812,8 +4540,8 @@
         </p:nvSpPr>
         <p:spPr>
           <a:xfrm>
-            <a:off x="7954108" y="4764146"/>
-            <a:ext cx="1893277" cy="417664"/>
+            <a:off x="3110459" y="1559171"/>
+            <a:ext cx="4210441" cy="298188"/>
           </a:xfrm>
           <a:prstGeom prst="rect">
             <a:avLst/>
@@ -4849,270 +4577,12 @@
           <a:p>
             <a:pPr algn="ctr"/>
             <a:r>
-              <a:rPr lang="ko-KR" altLang="en-US" sz="1000" dirty="0">
+              <a:rPr lang="ko-KR" altLang="en-US" dirty="0">
                 <a:solidFill>
                   <a:schemeClr val="accent1"/>
                 </a:solidFill>
               </a:rPr>
-              <a:t>해당 지역 세부사항 페이지로 이동</a:t>
-            </a:r>
-          </a:p>
-        </p:txBody>
-      </p:sp>
-      <p:sp>
-        <p:nvSpPr>
-          <p:cNvPr id="9" name="타원 8">
-            <a:extLst>
-              <a:ext uri="{FF2B5EF4-FFF2-40B4-BE49-F238E27FC236}">
-                <a16:creationId xmlns:a16="http://schemas.microsoft.com/office/drawing/2014/main" id="{90B495F0-A642-4739-B379-8B4392F9A188}"/>
-              </a:ext>
-            </a:extLst>
-          </p:cNvPr>
-          <p:cNvSpPr/>
-          <p:nvPr/>
-        </p:nvSpPr>
-        <p:spPr>
-          <a:xfrm>
-            <a:off x="2949856" y="4284785"/>
-            <a:ext cx="3651739" cy="382358"/>
-          </a:xfrm>
-          <a:prstGeom prst="ellipse">
-            <a:avLst/>
-          </a:prstGeom>
-          <a:noFill/>
-          <a:ln w="9525" cap="flat" cmpd="sng" algn="ctr">
-            <a:solidFill>
-              <a:schemeClr val="accent1"/>
-            </a:solidFill>
-            <a:prstDash val="solid"/>
-            <a:round/>
-            <a:headEnd type="none" w="med" len="med"/>
-            <a:tailEnd type="none" w="med" len="med"/>
-          </a:ln>
-        </p:spPr>
-        <p:style>
-          <a:lnRef idx="0">
-            <a:scrgbClr r="0" g="0" b="0"/>
-          </a:lnRef>
-          <a:fillRef idx="0">
-            <a:scrgbClr r="0" g="0" b="0"/>
-          </a:fillRef>
-          <a:effectRef idx="0">
-            <a:scrgbClr r="0" g="0" b="0"/>
-          </a:effectRef>
-          <a:fontRef idx="minor">
-            <a:schemeClr val="accent1"/>
-          </a:fontRef>
-        </p:style>
-        <p:txBody>
-          <a:bodyPr rtlCol="0" anchor="ctr"/>
-          <a:lstStyle/>
-          <a:p>
-            <a:pPr algn="ctr"/>
-            <a:endParaRPr lang="ko-KR" altLang="en-US"/>
-          </a:p>
-        </p:txBody>
-      </p:sp>
-      <p:cxnSp>
-        <p:nvCxnSpPr>
-          <p:cNvPr id="30" name="직선 화살표 연결선 29">
-            <a:extLst>
-              <a:ext uri="{FF2B5EF4-FFF2-40B4-BE49-F238E27FC236}">
-                <a16:creationId xmlns:a16="http://schemas.microsoft.com/office/drawing/2014/main" id="{0ACABB11-B3D7-4552-AE80-97B88DEC4522}"/>
-              </a:ext>
-            </a:extLst>
-          </p:cNvPr>
-          <p:cNvCxnSpPr>
-            <a:cxnSpLocks/>
-          </p:cNvCxnSpPr>
-          <p:nvPr/>
-        </p:nvCxnSpPr>
-        <p:spPr>
-          <a:xfrm>
-            <a:off x="3587277" y="4710130"/>
-            <a:ext cx="279912" cy="149971"/>
-          </a:xfrm>
-          <a:prstGeom prst="straightConnector1">
-            <a:avLst/>
-          </a:prstGeom>
-          <a:ln>
-            <a:tailEnd type="triangle"/>
-          </a:ln>
-        </p:spPr>
-        <p:style>
-          <a:lnRef idx="1">
-            <a:schemeClr val="accent1"/>
-          </a:lnRef>
-          <a:fillRef idx="0">
-            <a:schemeClr val="accent1"/>
-          </a:fillRef>
-          <a:effectRef idx="0">
-            <a:schemeClr val="accent1"/>
-          </a:effectRef>
-          <a:fontRef idx="minor">
-            <a:schemeClr val="tx1"/>
-          </a:fontRef>
-        </p:style>
-      </p:cxnSp>
-      <p:sp>
-        <p:nvSpPr>
-          <p:cNvPr id="16" name="직사각형 15">
-            <a:extLst>
-              <a:ext uri="{FF2B5EF4-FFF2-40B4-BE49-F238E27FC236}">
-                <a16:creationId xmlns:a16="http://schemas.microsoft.com/office/drawing/2014/main" id="{16BB8D15-F27A-4640-B998-3609B66409EA}"/>
-              </a:ext>
-            </a:extLst>
-          </p:cNvPr>
-          <p:cNvSpPr/>
-          <p:nvPr/>
-        </p:nvSpPr>
-        <p:spPr>
-          <a:xfrm>
-            <a:off x="3867189" y="4863371"/>
-            <a:ext cx="2015437" cy="298188"/>
-          </a:xfrm>
-          <a:prstGeom prst="rect">
-            <a:avLst/>
-          </a:prstGeom>
-          <a:solidFill>
-            <a:schemeClr val="bg1"/>
-          </a:solidFill>
-          <a:ln>
-            <a:solidFill>
-              <a:schemeClr val="bg1"/>
-            </a:solidFill>
-          </a:ln>
-        </p:spPr>
-        <p:style>
-          <a:lnRef idx="2">
-            <a:schemeClr val="accent1">
-              <a:shade val="50000"/>
-            </a:schemeClr>
-          </a:lnRef>
-          <a:fillRef idx="1">
-            <a:schemeClr val="accent1"/>
-          </a:fillRef>
-          <a:effectRef idx="0">
-            <a:schemeClr val="accent1"/>
-          </a:effectRef>
-          <a:fontRef idx="minor">
-            <a:schemeClr val="lt1"/>
-          </a:fontRef>
-        </p:style>
-        <p:txBody>
-          <a:bodyPr rtlCol="0" anchor="ctr"/>
-          <a:lstStyle/>
-          <a:p>
-            <a:pPr algn="ctr"/>
-            <a:r>
-              <a:rPr lang="ko-KR" altLang="en-US" sz="1000" dirty="0">
-                <a:solidFill>
-                  <a:schemeClr val="accent1"/>
-                </a:solidFill>
-              </a:rPr>
-              <a:t>해당 지역 추천장소 미리보기</a:t>
-            </a:r>
-          </a:p>
-        </p:txBody>
-      </p:sp>
-      <p:cxnSp>
-        <p:nvCxnSpPr>
-          <p:cNvPr id="35" name="직선 화살표 연결선 34">
-            <a:extLst>
-              <a:ext uri="{FF2B5EF4-FFF2-40B4-BE49-F238E27FC236}">
-                <a16:creationId xmlns:a16="http://schemas.microsoft.com/office/drawing/2014/main" id="{7D834F6B-D3C6-489B-B22F-4A5296D94519}"/>
-              </a:ext>
-            </a:extLst>
-          </p:cNvPr>
-          <p:cNvCxnSpPr>
-            <a:cxnSpLocks/>
-          </p:cNvCxnSpPr>
-          <p:nvPr/>
-        </p:nvCxnSpPr>
-        <p:spPr>
-          <a:xfrm>
-            <a:off x="7904928" y="1784259"/>
-            <a:ext cx="499403" cy="0"/>
-          </a:xfrm>
-          <a:prstGeom prst="straightConnector1">
-            <a:avLst/>
-          </a:prstGeom>
-          <a:ln>
-            <a:tailEnd type="triangle"/>
-          </a:ln>
-        </p:spPr>
-        <p:style>
-          <a:lnRef idx="1">
-            <a:schemeClr val="accent1"/>
-          </a:lnRef>
-          <a:fillRef idx="0">
-            <a:schemeClr val="accent1"/>
-          </a:fillRef>
-          <a:effectRef idx="0">
-            <a:schemeClr val="accent1"/>
-          </a:effectRef>
-          <a:fontRef idx="minor">
-            <a:schemeClr val="tx1"/>
-          </a:fontRef>
-        </p:style>
-      </p:cxnSp>
-      <p:sp>
-        <p:nvSpPr>
-          <p:cNvPr id="38" name="직사각형 37">
-            <a:extLst>
-              <a:ext uri="{FF2B5EF4-FFF2-40B4-BE49-F238E27FC236}">
-                <a16:creationId xmlns:a16="http://schemas.microsoft.com/office/drawing/2014/main" id="{F27B44B6-8FFE-4964-9389-B3FA314424AE}"/>
-              </a:ext>
-            </a:extLst>
-          </p:cNvPr>
-          <p:cNvSpPr/>
-          <p:nvPr/>
-        </p:nvSpPr>
-        <p:spPr>
-          <a:xfrm>
-            <a:off x="8467533" y="1592738"/>
-            <a:ext cx="1893277" cy="417664"/>
-          </a:xfrm>
-          <a:prstGeom prst="rect">
-            <a:avLst/>
-          </a:prstGeom>
-          <a:solidFill>
-            <a:schemeClr val="bg1"/>
-          </a:solidFill>
-          <a:ln>
-            <a:solidFill>
-              <a:schemeClr val="bg1"/>
-            </a:solidFill>
-          </a:ln>
-        </p:spPr>
-        <p:style>
-          <a:lnRef idx="2">
-            <a:schemeClr val="accent1">
-              <a:shade val="50000"/>
-            </a:schemeClr>
-          </a:lnRef>
-          <a:fillRef idx="1">
-            <a:schemeClr val="accent1"/>
-          </a:fillRef>
-          <a:effectRef idx="0">
-            <a:schemeClr val="accent1"/>
-          </a:effectRef>
-          <a:fontRef idx="minor">
-            <a:schemeClr val="lt1"/>
-          </a:fontRef>
-        </p:style>
-        <p:txBody>
-          <a:bodyPr rtlCol="0" anchor="ctr"/>
-          <a:lstStyle/>
-          <a:p>
-            <a:pPr algn="ctr"/>
-            <a:r>
-              <a:rPr lang="ko-KR" altLang="en-US" sz="1000" dirty="0">
-                <a:solidFill>
-                  <a:schemeClr val="accent1"/>
-                </a:solidFill>
-              </a:rPr>
-              <a:t>모든 지역에 대한 전체 검색</a:t>
+              <a:t>추천장소 미리보기</a:t>
             </a:r>
           </a:p>
         </p:txBody>
@@ -5169,53 +4639,12 @@
           </a:p>
         </p:txBody>
       </p:sp>
-      <p:cxnSp>
-        <p:nvCxnSpPr>
-          <p:cNvPr id="39" name="직선 화살표 연결선 38">
-            <a:extLst>
-              <a:ext uri="{FF2B5EF4-FFF2-40B4-BE49-F238E27FC236}">
-                <a16:creationId xmlns:a16="http://schemas.microsoft.com/office/drawing/2014/main" id="{C1C445A9-1D2D-4442-A0EB-F00BB233ED67}"/>
-              </a:ext>
-            </a:extLst>
-          </p:cNvPr>
-          <p:cNvCxnSpPr>
-            <a:cxnSpLocks/>
-          </p:cNvCxnSpPr>
-          <p:nvPr/>
-        </p:nvCxnSpPr>
-        <p:spPr>
-          <a:xfrm flipV="1">
-            <a:off x="1043605" y="1459895"/>
-            <a:ext cx="290643" cy="267051"/>
-          </a:xfrm>
-          <a:prstGeom prst="straightConnector1">
-            <a:avLst/>
-          </a:prstGeom>
-          <a:ln>
-            <a:tailEnd type="triangle"/>
-          </a:ln>
-        </p:spPr>
-        <p:style>
-          <a:lnRef idx="1">
-            <a:schemeClr val="accent1"/>
-          </a:lnRef>
-          <a:fillRef idx="0">
-            <a:schemeClr val="accent1"/>
-          </a:fillRef>
-          <a:effectRef idx="0">
-            <a:schemeClr val="accent1"/>
-          </a:effectRef>
-          <a:fontRef idx="minor">
-            <a:schemeClr val="tx1"/>
-          </a:fontRef>
-        </p:style>
-      </p:cxnSp>
-      <p:sp>
-        <p:nvSpPr>
-          <p:cNvPr id="41" name="직사각형 40">
-            <a:extLst>
-              <a:ext uri="{FF2B5EF4-FFF2-40B4-BE49-F238E27FC236}">
-                <a16:creationId xmlns:a16="http://schemas.microsoft.com/office/drawing/2014/main" id="{6B4F42CC-888F-4AAF-A58E-4031E8683E62}"/>
+      <p:sp>
+        <p:nvSpPr>
+          <p:cNvPr id="5" name="타원 4">
+            <a:extLst>
+              <a:ext uri="{FF2B5EF4-FFF2-40B4-BE49-F238E27FC236}">
+                <a16:creationId xmlns:a16="http://schemas.microsoft.com/office/drawing/2014/main" id="{E6BC3AB6-827E-4419-ADA8-5B69023403C3}"/>
               </a:ext>
             </a:extLst>
           </p:cNvPr>
@@ -5224,81 +4653,7 @@
         </p:nvSpPr>
         <p:spPr>
           <a:xfrm>
-            <a:off x="1167028" y="1104091"/>
-            <a:ext cx="1680673" cy="288276"/>
-          </a:xfrm>
-          <a:prstGeom prst="rect">
-            <a:avLst/>
-          </a:prstGeom>
-          <a:solidFill>
-            <a:schemeClr val="bg1"/>
-          </a:solidFill>
-          <a:ln>
-            <a:solidFill>
-              <a:schemeClr val="bg1"/>
-            </a:solidFill>
-          </a:ln>
-        </p:spPr>
-        <p:style>
-          <a:lnRef idx="2">
-            <a:schemeClr val="accent1">
-              <a:shade val="50000"/>
-            </a:schemeClr>
-          </a:lnRef>
-          <a:fillRef idx="1">
-            <a:schemeClr val="accent1"/>
-          </a:fillRef>
-          <a:effectRef idx="0">
-            <a:schemeClr val="accent1"/>
-          </a:effectRef>
-          <a:fontRef idx="minor">
-            <a:schemeClr val="lt1"/>
-          </a:fontRef>
-        </p:style>
-        <p:txBody>
-          <a:bodyPr rtlCol="0" anchor="ctr"/>
-          <a:lstStyle/>
-          <a:p>
-            <a:pPr algn="ctr"/>
-            <a:r>
-              <a:rPr lang="ko-KR" altLang="en-US" sz="1000" dirty="0">
-                <a:solidFill>
-                  <a:schemeClr val="accent1"/>
-                </a:solidFill>
-              </a:rPr>
-              <a:t>사이트내 </a:t>
-            </a:r>
-            <a:r>
-              <a:rPr lang="ko-KR" altLang="en-US" sz="1000" dirty="0" err="1">
-                <a:solidFill>
-                  <a:schemeClr val="accent1"/>
-                </a:solidFill>
-              </a:rPr>
-              <a:t>메뉴바</a:t>
-            </a:r>
-            <a:endParaRPr lang="ko-KR" altLang="en-US" sz="1000" dirty="0">
-              <a:solidFill>
-                <a:schemeClr val="accent1"/>
-              </a:solidFill>
-            </a:endParaRPr>
-          </a:p>
-        </p:txBody>
-      </p:sp>
-      <p:sp>
-        <p:nvSpPr>
-          <p:cNvPr id="5" name="타원 4">
-            <a:extLst>
-              <a:ext uri="{FF2B5EF4-FFF2-40B4-BE49-F238E27FC236}">
-                <a16:creationId xmlns:a16="http://schemas.microsoft.com/office/drawing/2014/main" id="{E6BC3AB6-827E-4419-ADA8-5B69023403C3}"/>
-              </a:ext>
-            </a:extLst>
-          </p:cNvPr>
-          <p:cNvSpPr/>
-          <p:nvPr/>
-        </p:nvSpPr>
-        <p:spPr>
-          <a:xfrm>
-            <a:off x="3062996" y="1668981"/>
+            <a:off x="100580" y="2110537"/>
             <a:ext cx="395111" cy="268044"/>
           </a:xfrm>
           <a:prstGeom prst="ellipse">
@@ -5351,7 +4706,7 @@
         </p:nvSpPr>
         <p:spPr>
           <a:xfrm>
-            <a:off x="4181545" y="4337653"/>
+            <a:off x="2142869" y="3545758"/>
             <a:ext cx="395111" cy="268044"/>
           </a:xfrm>
           <a:prstGeom prst="ellipse">
@@ -5404,7 +4759,7 @@
         </p:nvSpPr>
         <p:spPr>
           <a:xfrm>
-            <a:off x="9832100" y="4463169"/>
+            <a:off x="9544091" y="5542466"/>
             <a:ext cx="395111" cy="268044"/>
           </a:xfrm>
           <a:prstGeom prst="ellipse">
@@ -5457,7 +4812,7 @@
         </p:nvSpPr>
         <p:spPr>
           <a:xfrm>
-            <a:off x="1234252" y="2840042"/>
+            <a:off x="3542667" y="1589315"/>
             <a:ext cx="395111" cy="268044"/>
           </a:xfrm>
           <a:prstGeom prst="ellipse">
@@ -5498,10 +4853,10 @@
       </p:sp>
       <p:sp>
         <p:nvSpPr>
-          <p:cNvPr id="8" name="직사각형 7">
-            <a:extLst>
-              <a:ext uri="{FF2B5EF4-FFF2-40B4-BE49-F238E27FC236}">
-                <a16:creationId xmlns:a16="http://schemas.microsoft.com/office/drawing/2014/main" id="{609D0054-B3A0-48D8-979A-F4DD7D031228}"/>
+          <p:cNvPr id="37" name="타원 36">
+            <a:extLst>
+              <a:ext uri="{FF2B5EF4-FFF2-40B4-BE49-F238E27FC236}">
+                <a16:creationId xmlns:a16="http://schemas.microsoft.com/office/drawing/2014/main" id="{7AFFE2AD-5EE6-47B0-B5A8-798A5C6AD77E}"/>
               </a:ext>
             </a:extLst>
           </p:cNvPr>
@@ -5510,20 +4865,15 @@
         </p:nvSpPr>
         <p:spPr>
           <a:xfrm>
-            <a:off x="1893315" y="3784899"/>
-            <a:ext cx="6930202" cy="323840"/>
+            <a:off x="5381549" y="6356234"/>
+            <a:ext cx="395111" cy="268044"/>
           </a:xfrm>
-          <a:prstGeom prst="rect">
+          <a:prstGeom prst="ellipse">
             <a:avLst/>
           </a:prstGeom>
           <a:solidFill>
-            <a:schemeClr val="bg1"/>
+            <a:srgbClr val="FF0000"/>
           </a:solidFill>
-          <a:ln>
-            <a:solidFill>
-              <a:schemeClr val="bg1"/>
-            </a:solidFill>
-          </a:ln>
         </p:spPr>
         <p:style>
           <a:lnRef idx="2">
@@ -5547,13 +4897,49 @@
           <a:p>
             <a:pPr algn="ctr"/>
             <a:r>
-              <a:rPr lang="ko-KR" altLang="en-US" dirty="0">
-                <a:solidFill>
-                  <a:schemeClr val="tx1"/>
-                </a:solidFill>
-              </a:rPr>
-              <a:t>사진에 해당하는 여행지 이름</a:t>
-            </a:r>
+              <a:rPr lang="en-US" altLang="ko-KR" dirty="0"/>
+              <a:t>5</a:t>
+            </a:r>
+            <a:endParaRPr lang="ko-KR" altLang="en-US" dirty="0"/>
+          </a:p>
+        </p:txBody>
+      </p:sp>
+      <p:sp>
+        <p:nvSpPr>
+          <p:cNvPr id="40" name="TextBox 39">
+            <a:extLst>
+              <a:ext uri="{FF2B5EF4-FFF2-40B4-BE49-F238E27FC236}">
+                <a16:creationId xmlns:a16="http://schemas.microsoft.com/office/drawing/2014/main" id="{81AF874F-3F36-4FF4-B7AB-98DC90B547A7}"/>
+              </a:ext>
+            </a:extLst>
+          </p:cNvPr>
+          <p:cNvSpPr txBox="1"/>
+          <p:nvPr/>
+        </p:nvSpPr>
+        <p:spPr>
+          <a:xfrm>
+            <a:off x="123360" y="6248100"/>
+            <a:ext cx="1746477" cy="369332"/>
+          </a:xfrm>
+          <a:prstGeom prst="rect">
+            <a:avLst/>
+          </a:prstGeom>
+          <a:solidFill>
+            <a:schemeClr val="bg1"/>
+          </a:solidFill>
+        </p:spPr>
+        <p:txBody>
+          <a:bodyPr wrap="square" rtlCol="0">
+            <a:spAutoFit/>
+          </a:bodyPr>
+          <a:lstStyle/>
+          <a:p>
+            <a:pPr algn="ctr"/>
+            <a:r>
+              <a:rPr lang="en-US" altLang="ko-KR"/>
+              <a:t>“…/…/	”</a:t>
+            </a:r>
+            <a:endParaRPr lang="en-US" altLang="ko-KR" dirty="0"/>
           </a:p>
         </p:txBody>
       </p:sp>
@@ -5601,7 +4987,7 @@
         </p:nvSpPr>
         <p:spPr>
           <a:xfrm>
-            <a:off x="0" y="879904"/>
+            <a:off x="-5800" y="879904"/>
             <a:ext cx="10536965" cy="5685934"/>
           </a:xfrm>
           <a:prstGeom prst="rect">
@@ -5678,7 +5064,7 @@
         </p:nvSpPr>
         <p:spPr>
           <a:xfrm>
-            <a:off x="33707" y="43463"/>
+            <a:off x="20082" y="20934"/>
             <a:ext cx="10536965" cy="761696"/>
           </a:xfrm>
           <a:prstGeom prst="rect">
@@ -5931,14 +5317,14 @@
           <p:nvPr>
             <p:extLst>
               <p:ext uri="{D42A27DB-BD31-4B8C-83A1-F6EECF244321}">
-                <p14:modId xmlns:p14="http://schemas.microsoft.com/office/powerpoint/2010/main" val="2621319491"/>
+                <p14:modId xmlns:p14="http://schemas.microsoft.com/office/powerpoint/2010/main" val="2235029523"/>
               </p:ext>
             </p:extLst>
           </p:nvPr>
         </p:nvGraphicFramePr>
         <p:xfrm>
-          <a:off x="2763141" y="1534525"/>
-          <a:ext cx="5078100" cy="731520"/>
+          <a:off x="1459170" y="1722576"/>
+          <a:ext cx="5903298" cy="731520"/>
         </p:xfrm>
         <a:graphic>
           <a:graphicData uri="http://schemas.openxmlformats.org/drawingml/2006/table">
@@ -5947,21 +5333,63 @@
                 <a:tableStyleId>{616DA210-FB5B-4158-B5E0-FEB733F419BA}</a:tableStyleId>
               </a:tblPr>
               <a:tblGrid>
-                <a:gridCol w="1692700">
+                <a:gridCol w="655922">
+                  <a:extLst>
+                    <a:ext uri="{9D8B030D-6E8A-4147-A177-3AD203B41FA5}">
+                      <a16:colId xmlns:a16="http://schemas.microsoft.com/office/drawing/2014/main" val="3438696452"/>
+                    </a:ext>
+                  </a:extLst>
+                </a:gridCol>
+                <a:gridCol w="655922">
                   <a:extLst>
                     <a:ext uri="{9D8B030D-6E8A-4147-A177-3AD203B41FA5}">
                       <a16:colId xmlns:a16="http://schemas.microsoft.com/office/drawing/2014/main" val="3338090414"/>
                     </a:ext>
                   </a:extLst>
                 </a:gridCol>
-                <a:gridCol w="1692700">
+                <a:gridCol w="655922">
                   <a:extLst>
                     <a:ext uri="{9D8B030D-6E8A-4147-A177-3AD203B41FA5}">
                       <a16:colId xmlns:a16="http://schemas.microsoft.com/office/drawing/2014/main" val="2400868180"/>
                     </a:ext>
                   </a:extLst>
                 </a:gridCol>
-                <a:gridCol w="1692700">
+                <a:gridCol w="655922">
+                  <a:extLst>
+                    <a:ext uri="{9D8B030D-6E8A-4147-A177-3AD203B41FA5}">
+                      <a16:colId xmlns:a16="http://schemas.microsoft.com/office/drawing/2014/main" val="1324104437"/>
+                    </a:ext>
+                  </a:extLst>
+                </a:gridCol>
+                <a:gridCol w="655922">
+                  <a:extLst>
+                    <a:ext uri="{9D8B030D-6E8A-4147-A177-3AD203B41FA5}">
+                      <a16:colId xmlns:a16="http://schemas.microsoft.com/office/drawing/2014/main" val="248815989"/>
+                    </a:ext>
+                  </a:extLst>
+                </a:gridCol>
+                <a:gridCol w="655922">
+                  <a:extLst>
+                    <a:ext uri="{9D8B030D-6E8A-4147-A177-3AD203B41FA5}">
+                      <a16:colId xmlns:a16="http://schemas.microsoft.com/office/drawing/2014/main" val="3729257782"/>
+                    </a:ext>
+                  </a:extLst>
+                </a:gridCol>
+                <a:gridCol w="655922">
+                  <a:extLst>
+                    <a:ext uri="{9D8B030D-6E8A-4147-A177-3AD203B41FA5}">
+                      <a16:colId xmlns:a16="http://schemas.microsoft.com/office/drawing/2014/main" val="4204540080"/>
+                    </a:ext>
+                  </a:extLst>
+                </a:gridCol>
+                <a:gridCol w="655922">
+                  <a:extLst>
+                    <a:ext uri="{9D8B030D-6E8A-4147-A177-3AD203B41FA5}">
+                      <a16:colId xmlns:a16="http://schemas.microsoft.com/office/drawing/2014/main" val="1692787209"/>
+                    </a:ext>
+                  </a:extLst>
+                </a:gridCol>
+                <a:gridCol w="655922">
                   <a:extLst>
                     <a:ext uri="{9D8B030D-6E8A-4147-A177-3AD203B41FA5}">
                       <a16:colId xmlns:a16="http://schemas.microsoft.com/office/drawing/2014/main" val="2940568656"/>
@@ -5969,7 +5397,21 @@
                   </a:extLst>
                 </a:gridCol>
               </a:tblGrid>
-              <a:tr h="335437">
+              <a:tr h="325975">
+                <a:tc>
+                  <a:txBody>
+                    <a:bodyPr/>
+                    <a:lstStyle/>
+                    <a:p>
+                      <a:pPr algn="ctr" latinLnBrk="1"/>
+                      <a:r>
+                        <a:rPr lang="ko-KR" altLang="en-US" dirty="0"/>
+                        <a:t>전체</a:t>
+                      </a:r>
+                    </a:p>
+                  </a:txBody>
+                  <a:tcPr/>
+                </a:tc>
                 <a:tc>
                   <a:txBody>
                     <a:bodyPr/>
@@ -5992,7 +5434,7 @@
                       <a:pPr algn="ctr" latinLnBrk="1"/>
                       <a:r>
                         <a:rPr lang="ko-KR" altLang="en-US" dirty="0"/>
-                        <a:t>경인</a:t>
+                        <a:t>인천</a:t>
                       </a:r>
                     </a:p>
                   </a:txBody>
@@ -6006,7 +5448,77 @@
                       <a:pPr algn="ctr" latinLnBrk="1"/>
                       <a:r>
                         <a:rPr lang="ko-KR" altLang="en-US" dirty="0"/>
-                        <a:t>강원</a:t>
+                        <a:t>대전</a:t>
+                      </a:r>
+                    </a:p>
+                  </a:txBody>
+                  <a:tcPr/>
+                </a:tc>
+                <a:tc>
+                  <a:txBody>
+                    <a:bodyPr/>
+                    <a:lstStyle/>
+                    <a:p>
+                      <a:pPr algn="ctr" latinLnBrk="1"/>
+                      <a:r>
+                        <a:rPr lang="ko-KR" altLang="en-US" dirty="0"/>
+                        <a:t>대구</a:t>
+                      </a:r>
+                    </a:p>
+                  </a:txBody>
+                  <a:tcPr/>
+                </a:tc>
+                <a:tc>
+                  <a:txBody>
+                    <a:bodyPr/>
+                    <a:lstStyle/>
+                    <a:p>
+                      <a:pPr algn="ctr" latinLnBrk="1"/>
+                      <a:r>
+                        <a:rPr lang="ko-KR" altLang="en-US" dirty="0"/>
+                        <a:t>광주</a:t>
+                      </a:r>
+                    </a:p>
+                  </a:txBody>
+                  <a:tcPr/>
+                </a:tc>
+                <a:tc>
+                  <a:txBody>
+                    <a:bodyPr/>
+                    <a:lstStyle/>
+                    <a:p>
+                      <a:pPr algn="ctr" latinLnBrk="1"/>
+                      <a:r>
+                        <a:rPr lang="ko-KR" altLang="en-US" dirty="0"/>
+                        <a:t>부산</a:t>
+                      </a:r>
+                    </a:p>
+                  </a:txBody>
+                  <a:tcPr/>
+                </a:tc>
+                <a:tc>
+                  <a:txBody>
+                    <a:bodyPr/>
+                    <a:lstStyle/>
+                    <a:p>
+                      <a:pPr algn="ctr" latinLnBrk="1"/>
+                      <a:r>
+                        <a:rPr lang="ko-KR" altLang="en-US" dirty="0"/>
+                        <a:t>울산</a:t>
+                      </a:r>
+                    </a:p>
+                  </a:txBody>
+                  <a:tcPr/>
+                </a:tc>
+                <a:tc>
+                  <a:txBody>
+                    <a:bodyPr/>
+                    <a:lstStyle/>
+                    <a:p>
+                      <a:pPr algn="ctr" latinLnBrk="1"/>
+                      <a:r>
+                        <a:rPr lang="ko-KR" altLang="en-US" dirty="0"/>
+                        <a:t>세종</a:t>
                       </a:r>
                     </a:p>
                   </a:txBody>
@@ -6027,7 +5539,7 @@
                       <a:pPr algn="ctr" latinLnBrk="1"/>
                       <a:r>
                         <a:rPr lang="ko-KR" altLang="en-US" dirty="0"/>
-                        <a:t>전라</a:t>
+                        <a:t>경기</a:t>
                       </a:r>
                     </a:p>
                   </a:txBody>
@@ -6041,7 +5553,7 @@
                       <a:pPr algn="ctr" latinLnBrk="1"/>
                       <a:r>
                         <a:rPr lang="ko-KR" altLang="en-US" dirty="0"/>
-                        <a:t>경상</a:t>
+                        <a:t>강원</a:t>
                       </a:r>
                     </a:p>
                   </a:txBody>
@@ -6053,6 +5565,89 @@
                     <a:lstStyle/>
                     <a:p>
                       <a:pPr algn="ctr" latinLnBrk="1"/>
+                      <a:r>
+                        <a:rPr lang="ko-KR" altLang="en-US" dirty="0"/>
+                        <a:t>충북</a:t>
+                      </a:r>
+                    </a:p>
+                  </a:txBody>
+                  <a:tcPr/>
+                </a:tc>
+                <a:tc>
+                  <a:txBody>
+                    <a:bodyPr/>
+                    <a:lstStyle/>
+                    <a:p>
+                      <a:pPr algn="ctr" latinLnBrk="1"/>
+                      <a:r>
+                        <a:rPr lang="ko-KR" altLang="en-US" dirty="0"/>
+                        <a:t>충남</a:t>
+                      </a:r>
+                    </a:p>
+                  </a:txBody>
+                  <a:tcPr/>
+                </a:tc>
+                <a:tc>
+                  <a:txBody>
+                    <a:bodyPr/>
+                    <a:lstStyle/>
+                    <a:p>
+                      <a:pPr algn="ctr" latinLnBrk="1"/>
+                      <a:r>
+                        <a:rPr lang="ko-KR" altLang="en-US" dirty="0"/>
+                        <a:t>경북</a:t>
+                      </a:r>
+                    </a:p>
+                  </a:txBody>
+                  <a:tcPr/>
+                </a:tc>
+                <a:tc>
+                  <a:txBody>
+                    <a:bodyPr/>
+                    <a:lstStyle/>
+                    <a:p>
+                      <a:pPr algn="ctr" latinLnBrk="1"/>
+                      <a:r>
+                        <a:rPr lang="ko-KR" altLang="en-US" dirty="0"/>
+                        <a:t>경남</a:t>
+                      </a:r>
+                    </a:p>
+                  </a:txBody>
+                  <a:tcPr/>
+                </a:tc>
+                <a:tc>
+                  <a:txBody>
+                    <a:bodyPr/>
+                    <a:lstStyle/>
+                    <a:p>
+                      <a:pPr algn="ctr" latinLnBrk="1"/>
+                      <a:r>
+                        <a:rPr lang="ko-KR" altLang="en-US" dirty="0"/>
+                        <a:t>전북</a:t>
+                      </a:r>
+                    </a:p>
+                  </a:txBody>
+                  <a:tcPr/>
+                </a:tc>
+                <a:tc>
+                  <a:txBody>
+                    <a:bodyPr/>
+                    <a:lstStyle/>
+                    <a:p>
+                      <a:pPr algn="ctr" latinLnBrk="1"/>
+                      <a:r>
+                        <a:rPr lang="ko-KR" altLang="en-US" dirty="0"/>
+                        <a:t>전남</a:t>
+                      </a:r>
+                    </a:p>
+                  </a:txBody>
+                  <a:tcPr/>
+                </a:tc>
+                <a:tc>
+                  <a:txBody>
+                    <a:bodyPr/>
+                    <a:lstStyle/>
+                    <a:p>
                       <a:r>
                         <a:rPr lang="ko-KR" altLang="en-US" dirty="0"/>
                         <a:t>제주</a:t>
@@ -7143,14 +6738,14 @@
           <p:nvPr>
             <p:extLst>
               <p:ext uri="{D42A27DB-BD31-4B8C-83A1-F6EECF244321}">
-                <p14:modId xmlns:p14="http://schemas.microsoft.com/office/powerpoint/2010/main" val="1377246136"/>
+                <p14:modId xmlns:p14="http://schemas.microsoft.com/office/powerpoint/2010/main" val="2541651094"/>
               </p:ext>
             </p:extLst>
           </p:nvPr>
         </p:nvGraphicFramePr>
         <p:xfrm>
-          <a:off x="1482381" y="2471791"/>
-          <a:ext cx="4437405" cy="289560"/>
+          <a:off x="1459170" y="2442964"/>
+          <a:ext cx="5903304" cy="289560"/>
         </p:xfrm>
         <a:graphic>
           <a:graphicData uri="http://schemas.openxmlformats.org/drawingml/2006/table">
@@ -7159,35 +6754,42 @@
                 <a:tableStyleId>{69CF1AB2-1976-4502-BF36-3FF5EA218861}</a:tableStyleId>
               </a:tblPr>
               <a:tblGrid>
-                <a:gridCol w="887481">
+                <a:gridCol w="983884">
+                  <a:extLst>
+                    <a:ext uri="{9D8B030D-6E8A-4147-A177-3AD203B41FA5}">
+                      <a16:colId xmlns:a16="http://schemas.microsoft.com/office/drawing/2014/main" val="2693282127"/>
+                    </a:ext>
+                  </a:extLst>
+                </a:gridCol>
+                <a:gridCol w="983884">
                   <a:extLst>
                     <a:ext uri="{9D8B030D-6E8A-4147-A177-3AD203B41FA5}">
                       <a16:colId xmlns:a16="http://schemas.microsoft.com/office/drawing/2014/main" val="2098688488"/>
                     </a:ext>
                   </a:extLst>
                 </a:gridCol>
-                <a:gridCol w="887481">
+                <a:gridCol w="983884">
                   <a:extLst>
                     <a:ext uri="{9D8B030D-6E8A-4147-A177-3AD203B41FA5}">
                       <a16:colId xmlns:a16="http://schemas.microsoft.com/office/drawing/2014/main" val="1716631018"/>
                     </a:ext>
                   </a:extLst>
                 </a:gridCol>
-                <a:gridCol w="887481">
+                <a:gridCol w="983884">
                   <a:extLst>
                     <a:ext uri="{9D8B030D-6E8A-4147-A177-3AD203B41FA5}">
                       <a16:colId xmlns:a16="http://schemas.microsoft.com/office/drawing/2014/main" val="2081665447"/>
                     </a:ext>
                   </a:extLst>
                 </a:gridCol>
-                <a:gridCol w="887481">
+                <a:gridCol w="983884">
                   <a:extLst>
                     <a:ext uri="{9D8B030D-6E8A-4147-A177-3AD203B41FA5}">
                       <a16:colId xmlns:a16="http://schemas.microsoft.com/office/drawing/2014/main" val="2829460982"/>
                     </a:ext>
                   </a:extLst>
                 </a:gridCol>
-                <a:gridCol w="887481">
+                <a:gridCol w="983884">
                   <a:extLst>
                     <a:ext uri="{9D8B030D-6E8A-4147-A177-3AD203B41FA5}">
                       <a16:colId xmlns:a16="http://schemas.microsoft.com/office/drawing/2014/main" val="1983017555"/>
@@ -7196,6 +6798,20 @@
                 </a:gridCol>
               </a:tblGrid>
               <a:tr h="201082">
+                <a:tc>
+                  <a:txBody>
+                    <a:bodyPr/>
+                    <a:lstStyle/>
+                    <a:p>
+                      <a:pPr algn="ctr" latinLnBrk="1"/>
+                      <a:r>
+                        <a:rPr lang="ko-KR" altLang="en-US" sz="1300" dirty="0"/>
+                        <a:t>전체</a:t>
+                      </a:r>
+                    </a:p>
+                  </a:txBody>
+                  <a:tcPr/>
+                </a:tc>
                 <a:tc>
                   <a:txBody>
                     <a:bodyPr/>
@@ -7328,121 +6944,6 @@
           </a:p>
         </p:txBody>
       </p:sp>
-      <p:cxnSp>
-        <p:nvCxnSpPr>
-          <p:cNvPr id="31" name="직선 화살표 연결선 30">
-            <a:extLst>
-              <a:ext uri="{FF2B5EF4-FFF2-40B4-BE49-F238E27FC236}">
-                <a16:creationId xmlns:a16="http://schemas.microsoft.com/office/drawing/2014/main" id="{DA0765CB-5B68-4EDA-829F-1EA260CBEE93}"/>
-              </a:ext>
-            </a:extLst>
-          </p:cNvPr>
-          <p:cNvCxnSpPr>
-            <a:cxnSpLocks/>
-          </p:cNvCxnSpPr>
-          <p:nvPr/>
-        </p:nvCxnSpPr>
-        <p:spPr>
-          <a:xfrm flipV="1">
-            <a:off x="1191738" y="1619391"/>
-            <a:ext cx="290643" cy="267051"/>
-          </a:xfrm>
-          <a:prstGeom prst="straightConnector1">
-            <a:avLst/>
-          </a:prstGeom>
-          <a:ln>
-            <a:tailEnd type="triangle"/>
-          </a:ln>
-        </p:spPr>
-        <p:style>
-          <a:lnRef idx="1">
-            <a:schemeClr val="accent1"/>
-          </a:lnRef>
-          <a:fillRef idx="0">
-            <a:schemeClr val="accent1"/>
-          </a:fillRef>
-          <a:effectRef idx="0">
-            <a:schemeClr val="accent1"/>
-          </a:effectRef>
-          <a:fontRef idx="minor">
-            <a:schemeClr val="tx1"/>
-          </a:fontRef>
-        </p:style>
-      </p:cxnSp>
-      <p:sp>
-        <p:nvSpPr>
-          <p:cNvPr id="33" name="직사각형 32">
-            <a:extLst>
-              <a:ext uri="{FF2B5EF4-FFF2-40B4-BE49-F238E27FC236}">
-                <a16:creationId xmlns:a16="http://schemas.microsoft.com/office/drawing/2014/main" id="{5BF4D350-A176-472C-8E29-82BAC0395A57}"/>
-              </a:ext>
-            </a:extLst>
-          </p:cNvPr>
-          <p:cNvSpPr/>
-          <p:nvPr/>
-        </p:nvSpPr>
-        <p:spPr>
-          <a:xfrm>
-            <a:off x="1022648" y="1223862"/>
-            <a:ext cx="1680673" cy="288276"/>
-          </a:xfrm>
-          <a:prstGeom prst="rect">
-            <a:avLst/>
-          </a:prstGeom>
-          <a:solidFill>
-            <a:schemeClr val="bg1"/>
-          </a:solidFill>
-          <a:ln>
-            <a:solidFill>
-              <a:schemeClr val="bg1"/>
-            </a:solidFill>
-          </a:ln>
-        </p:spPr>
-        <p:style>
-          <a:lnRef idx="2">
-            <a:schemeClr val="accent1">
-              <a:shade val="50000"/>
-            </a:schemeClr>
-          </a:lnRef>
-          <a:fillRef idx="1">
-            <a:schemeClr val="accent1"/>
-          </a:fillRef>
-          <a:effectRef idx="0">
-            <a:schemeClr val="accent1"/>
-          </a:effectRef>
-          <a:fontRef idx="minor">
-            <a:schemeClr val="lt1"/>
-          </a:fontRef>
-        </p:style>
-        <p:txBody>
-          <a:bodyPr rtlCol="0" anchor="ctr"/>
-          <a:lstStyle/>
-          <a:p>
-            <a:pPr algn="ctr"/>
-            <a:r>
-              <a:rPr lang="ko-KR" altLang="en-US" sz="1000" dirty="0">
-                <a:solidFill>
-                  <a:schemeClr val="accent1"/>
-                </a:solidFill>
-              </a:rPr>
-              <a:t>사이트내 </a:t>
-            </a:r>
-            <a:r>
-              <a:rPr lang="ko-KR" altLang="en-US" sz="1000" dirty="0" err="1">
-                <a:solidFill>
-                  <a:schemeClr val="accent1"/>
-                </a:solidFill>
-              </a:rPr>
-              <a:t>메뉴바</a:t>
-            </a:r>
-            <a:endParaRPr lang="ko-KR" altLang="en-US" sz="1000" dirty="0">
-              <a:solidFill>
-                <a:schemeClr val="accent1"/>
-              </a:solidFill>
-            </a:endParaRPr>
-          </a:p>
-        </p:txBody>
-      </p:sp>
       <p:sp>
         <p:nvSpPr>
           <p:cNvPr id="32" name="직사각형 31">
@@ -7757,7 +7258,7 @@
         </p:nvSpPr>
         <p:spPr>
           <a:xfrm>
-            <a:off x="2641497" y="1368000"/>
+            <a:off x="1211075" y="1598221"/>
             <a:ext cx="395111" cy="268044"/>
           </a:xfrm>
           <a:prstGeom prst="ellipse">
@@ -7810,7 +7311,7 @@
         </p:nvSpPr>
         <p:spPr>
           <a:xfrm>
-            <a:off x="1321827" y="2315612"/>
+            <a:off x="1305132" y="2528841"/>
             <a:ext cx="395111" cy="268044"/>
           </a:xfrm>
           <a:prstGeom prst="ellipse">
@@ -7863,7 +7364,7 @@
         </p:nvSpPr>
         <p:spPr>
           <a:xfrm>
-            <a:off x="1457479" y="2967097"/>
+            <a:off x="1343597" y="4349570"/>
             <a:ext cx="395111" cy="268044"/>
           </a:xfrm>
           <a:prstGeom prst="ellipse">
@@ -7916,7 +7417,7 @@
         </p:nvSpPr>
         <p:spPr>
           <a:xfrm>
-            <a:off x="8139511" y="2427363"/>
+            <a:off x="8139510" y="2420898"/>
             <a:ext cx="1957558" cy="369332"/>
           </a:xfrm>
           <a:prstGeom prst="rect">
@@ -8073,7 +7574,7 @@
         </p:nvSpPr>
         <p:spPr>
           <a:xfrm>
-            <a:off x="6674664" y="6274260"/>
+            <a:off x="4717736" y="4089390"/>
             <a:ext cx="395111" cy="268044"/>
           </a:xfrm>
           <a:prstGeom prst="ellipse">
@@ -8125,7 +7626,7 @@
         </p:nvSpPr>
         <p:spPr>
           <a:xfrm>
-            <a:off x="8137999" y="2468928"/>
+            <a:off x="8058125" y="2369190"/>
             <a:ext cx="395111" cy="268044"/>
           </a:xfrm>
           <a:prstGeom prst="ellipse">
@@ -8161,6 +7662,96 @@
               <a:t>3</a:t>
             </a:r>
             <a:endParaRPr lang="ko-KR" altLang="en-US" dirty="0"/>
+          </a:p>
+        </p:txBody>
+      </p:sp>
+      <p:sp>
+        <p:nvSpPr>
+          <p:cNvPr id="36" name="타원 35">
+            <a:extLst>
+              <a:ext uri="{FF2B5EF4-FFF2-40B4-BE49-F238E27FC236}">
+                <a16:creationId xmlns:a16="http://schemas.microsoft.com/office/drawing/2014/main" id="{2F512DE7-ACD7-49E5-A2A3-925703B39309}"/>
+              </a:ext>
+            </a:extLst>
+          </p:cNvPr>
+          <p:cNvSpPr/>
+          <p:nvPr/>
+        </p:nvSpPr>
+        <p:spPr>
+          <a:xfrm>
+            <a:off x="3934190" y="6266363"/>
+            <a:ext cx="395111" cy="268044"/>
+          </a:xfrm>
+          <a:prstGeom prst="ellipse">
+            <a:avLst/>
+          </a:prstGeom>
+          <a:solidFill>
+            <a:srgbClr val="FF0000"/>
+          </a:solidFill>
+        </p:spPr>
+        <p:style>
+          <a:lnRef idx="2">
+            <a:schemeClr val="accent1">
+              <a:shade val="50000"/>
+            </a:schemeClr>
+          </a:lnRef>
+          <a:fillRef idx="1">
+            <a:schemeClr val="accent1"/>
+          </a:fillRef>
+          <a:effectRef idx="0">
+            <a:schemeClr val="accent1"/>
+          </a:effectRef>
+          <a:fontRef idx="minor">
+            <a:schemeClr val="lt1"/>
+          </a:fontRef>
+        </p:style>
+        <p:txBody>
+          <a:bodyPr rtlCol="0" anchor="ctr"/>
+          <a:lstStyle/>
+          <a:p>
+            <a:pPr algn="ctr"/>
+            <a:r>
+              <a:rPr lang="en-US" altLang="ko-KR" dirty="0"/>
+              <a:t>6</a:t>
+            </a:r>
+          </a:p>
+        </p:txBody>
+      </p:sp>
+      <p:sp>
+        <p:nvSpPr>
+          <p:cNvPr id="33" name="TextBox 32">
+            <a:extLst>
+              <a:ext uri="{FF2B5EF4-FFF2-40B4-BE49-F238E27FC236}">
+                <a16:creationId xmlns:a16="http://schemas.microsoft.com/office/drawing/2014/main" id="{208A0DBB-679D-432D-9121-72496E29ED48}"/>
+              </a:ext>
+            </a:extLst>
+          </p:cNvPr>
+          <p:cNvSpPr txBox="1"/>
+          <p:nvPr/>
+        </p:nvSpPr>
+        <p:spPr>
+          <a:xfrm>
+            <a:off x="60412" y="6292734"/>
+            <a:ext cx="1957558" cy="369332"/>
+          </a:xfrm>
+          <a:prstGeom prst="rect">
+            <a:avLst/>
+          </a:prstGeom>
+          <a:solidFill>
+            <a:schemeClr val="bg1"/>
+          </a:solidFill>
+        </p:spPr>
+        <p:txBody>
+          <a:bodyPr wrap="square" rtlCol="0">
+            <a:spAutoFit/>
+          </a:bodyPr>
+          <a:lstStyle/>
+          <a:p>
+            <a:pPr algn="ctr"/>
+            <a:r>
+              <a:rPr lang="en-US" altLang="ko-KR" dirty="0"/>
+              <a:t>“…/…/”</a:t>
+            </a:r>
           </a:p>
         </p:txBody>
       </p:sp>
@@ -8332,64 +7923,6 @@
               </a:rPr>
               <a:t>2</a:t>
             </a:r>
-          </a:p>
-        </p:txBody>
-      </p:sp>
-      <p:sp>
-        <p:nvSpPr>
-          <p:cNvPr id="6" name="제목 1">
-            <a:extLst>
-              <a:ext uri="{FF2B5EF4-FFF2-40B4-BE49-F238E27FC236}">
-                <a16:creationId xmlns:a16="http://schemas.microsoft.com/office/drawing/2014/main" id="{986BE736-04F3-43AA-8412-20D8505FBA8E}"/>
-              </a:ext>
-            </a:extLst>
-          </p:cNvPr>
-          <p:cNvSpPr txBox="1">
-            <a:spLocks/>
-          </p:cNvSpPr>
-          <p:nvPr/>
-        </p:nvSpPr>
-        <p:spPr>
-          <a:xfrm>
-            <a:off x="4299248" y="990841"/>
-            <a:ext cx="1680672" cy="761696"/>
-          </a:xfrm>
-          <a:prstGeom prst="rect">
-            <a:avLst/>
-          </a:prstGeom>
-        </p:spPr>
-        <p:txBody>
-          <a:bodyPr vert="horz" lIns="91440" tIns="45720" rIns="91440" bIns="45720" rtlCol="0" anchor="ctr">
-            <a:normAutofit/>
-          </a:bodyPr>
-          <a:lstStyle>
-            <a:lvl1pPr algn="l" defTabSz="914400" rtl="0" eaLnBrk="1" latinLnBrk="1" hangingPunct="1">
-              <a:lnSpc>
-                <a:spcPct val="90000"/>
-              </a:lnSpc>
-              <a:spcBef>
-                <a:spcPct val="0"/>
-              </a:spcBef>
-              <a:buNone/>
-              <a:defRPr sz="4400" kern="1200">
-                <a:solidFill>
-                  <a:schemeClr val="tx1"/>
-                </a:solidFill>
-                <a:latin typeface="+mj-lt"/>
-                <a:ea typeface="+mj-ea"/>
-                <a:cs typeface="+mj-cs"/>
-              </a:defRPr>
-            </a:lvl1pPr>
-          </a:lstStyle>
-          <a:p>
-            <a:r>
-              <a:rPr lang="ko-KR" altLang="en-US" sz="1800" dirty="0"/>
-              <a:t>사이트 이름</a:t>
-            </a:r>
-            <a:br>
-              <a:rPr lang="en-US" altLang="ko-KR" sz="1800" dirty="0"/>
-            </a:br>
-            <a:endParaRPr lang="ko-KR" altLang="en-US" sz="1800" dirty="0"/>
           </a:p>
         </p:txBody>
       </p:sp>
@@ -8591,7 +8124,7 @@
         </p:nvSpPr>
         <p:spPr>
           <a:xfrm>
-            <a:off x="1645110" y="1870237"/>
+            <a:off x="1640838" y="1662083"/>
             <a:ext cx="2170632" cy="1420738"/>
           </a:xfrm>
           <a:prstGeom prst="ellipse">
@@ -8653,13 +8186,13 @@
           <p:nvPr>
             <p:extLst>
               <p:ext uri="{D42A27DB-BD31-4B8C-83A1-F6EECF244321}">
-                <p14:modId xmlns:p14="http://schemas.microsoft.com/office/powerpoint/2010/main" val="1699500766"/>
+                <p14:modId xmlns:p14="http://schemas.microsoft.com/office/powerpoint/2010/main" val="763153382"/>
               </p:ext>
             </p:extLst>
           </p:nvPr>
         </p:nvGraphicFramePr>
         <p:xfrm>
-          <a:off x="4456764" y="1660531"/>
+          <a:off x="1102872" y="3401227"/>
           <a:ext cx="3294984" cy="2169940"/>
         </p:xfrm>
         <a:graphic>
@@ -8683,12 +8216,49 @@
                     <a:bodyPr/>
                     <a:lstStyle/>
                     <a:p>
-                      <a:pPr algn="ctr" latinLnBrk="1"/>
+                      <a:pPr marL="0" marR="0" lvl="0" indent="0" algn="ctr" defTabSz="914400" rtl="0" eaLnBrk="1" fontAlgn="auto" latinLnBrk="1" hangingPunct="1">
+                        <a:lnSpc>
+                          <a:spcPct val="100000"/>
+                        </a:lnSpc>
+                        <a:spcBef>
+                          <a:spcPts val="0"/>
+                        </a:spcBef>
+                        <a:spcAft>
+                          <a:spcPts val="0"/>
+                        </a:spcAft>
+                        <a:buClrTx/>
+                        <a:buSzTx/>
+                        <a:buFontTx/>
+                        <a:buNone/>
+                        <a:tabLst/>
+                        <a:defRPr/>
+                      </a:pPr>
                       <a:r>
                         <a:rPr lang="ko-KR" altLang="en-US" dirty="0"/>
                         <a:t>기본 정보</a:t>
                       </a:r>
                       <a:endParaRPr lang="en-US" altLang="ko-KR" dirty="0"/>
+                    </a:p>
+                  </a:txBody>
+                  <a:tcPr/>
+                </a:tc>
+                <a:extLst>
+                  <a:ext uri="{0D108BD9-81ED-4DB2-BD59-A6C34878D82A}">
+                    <a16:rowId xmlns:a16="http://schemas.microsoft.com/office/drawing/2014/main" val="3200335247"/>
+                  </a:ext>
+                </a:extLst>
+              </a:tr>
+              <a:tr h="433988">
+                <a:tc>
+                  <a:txBody>
+                    <a:bodyPr/>
+                    <a:lstStyle/>
+                    <a:p>
+                      <a:pPr algn="ctr" latinLnBrk="1"/>
+                      <a:r>
+                        <a:rPr lang="en-US" altLang="ko-KR" dirty="0"/>
+                        <a:t>Spot title</a:t>
+                      </a:r>
                     </a:p>
                   </a:txBody>
                   <a:tcPr/>
@@ -8708,7 +8278,7 @@
                       <a:pPr algn="ctr" latinLnBrk="1"/>
                       <a:r>
                         <a:rPr lang="en-US" altLang="ko-KR" dirty="0"/>
-                        <a:t>Spot Location</a:t>
+                        <a:t>Spot addr1</a:t>
                       </a:r>
                     </a:p>
                   </a:txBody>
@@ -8768,162 +8338,6 @@
                   </a:ext>
                 </a:extLst>
               </a:tr>
-              <a:tr h="433988">
-                <a:tc>
-                  <a:txBody>
-                    <a:bodyPr/>
-                    <a:lstStyle/>
-                    <a:p>
-                      <a:pPr marL="0" marR="0" lvl="0" indent="0" algn="ctr" defTabSz="914400" rtl="0" eaLnBrk="1" fontAlgn="auto" latinLnBrk="1" hangingPunct="1">
-                        <a:lnSpc>
-                          <a:spcPct val="100000"/>
-                        </a:lnSpc>
-                        <a:spcBef>
-                          <a:spcPts val="0"/>
-                        </a:spcBef>
-                        <a:spcAft>
-                          <a:spcPts val="0"/>
-                        </a:spcAft>
-                        <a:buClrTx/>
-                        <a:buSzTx/>
-                        <a:buFontTx/>
-                        <a:buNone/>
-                        <a:tabLst/>
-                        <a:defRPr/>
-                      </a:pPr>
-                      <a:r>
-                        <a:rPr lang="en-US" altLang="ko-KR" dirty="0"/>
-                        <a:t>Spot Review</a:t>
-                      </a:r>
-                      <a:endParaRPr lang="ko-KR" altLang="en-US" dirty="0"/>
-                    </a:p>
-                  </a:txBody>
-                  <a:tcPr/>
-                </a:tc>
-                <a:extLst>
-                  <a:ext uri="{0D108BD9-81ED-4DB2-BD59-A6C34878D82A}">
-                    <a16:rowId xmlns:a16="http://schemas.microsoft.com/office/drawing/2014/main" val="684959689"/>
-                  </a:ext>
-                </a:extLst>
-              </a:tr>
-            </a:tbl>
-          </a:graphicData>
-        </a:graphic>
-      </p:graphicFrame>
-      <p:graphicFrame>
-        <p:nvGraphicFramePr>
-          <p:cNvPr id="2" name="표 1">
-            <a:extLst>
-              <a:ext uri="{FF2B5EF4-FFF2-40B4-BE49-F238E27FC236}">
-                <a16:creationId xmlns:a16="http://schemas.microsoft.com/office/drawing/2014/main" id="{E9487BE4-F518-49C4-B26B-F7958C16944A}"/>
-              </a:ext>
-            </a:extLst>
-          </p:cNvPr>
-          <p:cNvGraphicFramePr>
-            <a:graphicFrameLocks noGrp="1"/>
-          </p:cNvGraphicFramePr>
-          <p:nvPr>
-            <p:extLst>
-              <p:ext uri="{D42A27DB-BD31-4B8C-83A1-F6EECF244321}">
-                <p14:modId xmlns:p14="http://schemas.microsoft.com/office/powerpoint/2010/main" val="3002257260"/>
-              </p:ext>
-            </p:extLst>
-          </p:nvPr>
-        </p:nvGraphicFramePr>
-        <p:xfrm>
-          <a:off x="1645110" y="4589881"/>
-          <a:ext cx="5326322" cy="1703276"/>
-        </p:xfrm>
-        <a:graphic>
-          <a:graphicData uri="http://schemas.openxmlformats.org/drawingml/2006/table">
-            <a:tbl>
-              <a:tblPr firstRow="1" bandRow="1">
-                <a:tableStyleId>{9D7B26C5-4107-4FEC-AEDC-1716B250A1EF}</a:tableStyleId>
-              </a:tblPr>
-              <a:tblGrid>
-                <a:gridCol w="5326322">
-                  <a:extLst>
-                    <a:ext uri="{9D8B030D-6E8A-4147-A177-3AD203B41FA5}">
-                      <a16:colId xmlns:a16="http://schemas.microsoft.com/office/drawing/2014/main" val="125157343"/>
-                    </a:ext>
-                  </a:extLst>
-                </a:gridCol>
-              </a:tblGrid>
-              <a:tr h="425819">
-                <a:tc>
-                  <a:txBody>
-                    <a:bodyPr/>
-                    <a:lstStyle/>
-                    <a:p>
-                      <a:pPr algn="ctr" latinLnBrk="1"/>
-                      <a:r>
-                        <a:rPr lang="ko-KR" altLang="en-US" dirty="0"/>
-                        <a:t>이용 안내</a:t>
-                      </a:r>
-                    </a:p>
-                  </a:txBody>
-                  <a:tcPr/>
-                </a:tc>
-                <a:extLst>
-                  <a:ext uri="{0D108BD9-81ED-4DB2-BD59-A6C34878D82A}">
-                    <a16:rowId xmlns:a16="http://schemas.microsoft.com/office/drawing/2014/main" val="2208606725"/>
-                  </a:ext>
-                </a:extLst>
-              </a:tr>
-              <a:tr h="425819">
-                <a:tc>
-                  <a:txBody>
-                    <a:bodyPr/>
-                    <a:lstStyle/>
-                    <a:p>
-                      <a:pPr algn="ctr" latinLnBrk="1"/>
-                      <a:endParaRPr lang="ko-KR" altLang="en-US" dirty="0"/>
-                    </a:p>
-                  </a:txBody>
-                  <a:tcPr/>
-                </a:tc>
-                <a:extLst>
-                  <a:ext uri="{0D108BD9-81ED-4DB2-BD59-A6C34878D82A}">
-                    <a16:rowId xmlns:a16="http://schemas.microsoft.com/office/drawing/2014/main" val="555184064"/>
-                  </a:ext>
-                </a:extLst>
-              </a:tr>
-              <a:tr h="425819">
-                <a:tc>
-                  <a:txBody>
-                    <a:bodyPr/>
-                    <a:lstStyle/>
-                    <a:p>
-                      <a:pPr algn="ctr" latinLnBrk="1"/>
-                      <a:endParaRPr lang="ko-KR" altLang="en-US" dirty="0"/>
-                    </a:p>
-                  </a:txBody>
-                  <a:tcPr/>
-                </a:tc>
-                <a:extLst>
-                  <a:ext uri="{0D108BD9-81ED-4DB2-BD59-A6C34878D82A}">
-                    <a16:rowId xmlns:a16="http://schemas.microsoft.com/office/drawing/2014/main" val="2716599883"/>
-                  </a:ext>
-                </a:extLst>
-              </a:tr>
-              <a:tr h="425819">
-                <a:tc>
-                  <a:txBody>
-                    <a:bodyPr/>
-                    <a:lstStyle/>
-                    <a:p>
-                      <a:pPr algn="ctr" latinLnBrk="1"/>
-                      <a:endParaRPr lang="ko-KR" altLang="en-US" dirty="0"/>
-                    </a:p>
-                  </a:txBody>
-                  <a:tcPr/>
-                </a:tc>
-                <a:extLst>
-                  <a:ext uri="{0D108BD9-81ED-4DB2-BD59-A6C34878D82A}">
-                    <a16:rowId xmlns:a16="http://schemas.microsoft.com/office/drawing/2014/main" val="974241028"/>
-                  </a:ext>
-                </a:extLst>
-              </a:tr>
             </a:tbl>
           </a:graphicData>
         </a:graphic>
@@ -8990,11 +8404,370 @@
             <a:pPr marL="228600" indent="-228600">
               <a:buAutoNum type="arabicPeriod"/>
             </a:pPr>
+            <a:r>
+              <a:rPr lang="ko-KR" altLang="en-US" sz="1200" dirty="0">
+                <a:solidFill>
+                  <a:srgbClr val="FF0000"/>
+                </a:solidFill>
+              </a:rPr>
+              <a:t>선택한 지역의 사진 </a:t>
+            </a:r>
             <a:endParaRPr lang="en-US" altLang="ko-KR" sz="1200" dirty="0">
               <a:solidFill>
                 <a:srgbClr val="FF0000"/>
               </a:solidFill>
             </a:endParaRPr>
+          </a:p>
+          <a:p>
+            <a:pPr marL="228600" indent="-228600">
+              <a:buAutoNum type="arabicPeriod"/>
+            </a:pPr>
+            <a:endParaRPr lang="en-US" altLang="ko-KR" sz="1200" dirty="0">
+              <a:solidFill>
+                <a:srgbClr val="FF0000"/>
+              </a:solidFill>
+            </a:endParaRPr>
+          </a:p>
+          <a:p>
+            <a:pPr marL="228600" indent="-228600">
+              <a:buAutoNum type="arabicPeriod"/>
+            </a:pPr>
+            <a:r>
+              <a:rPr lang="ko-KR" altLang="en-US" sz="1200" dirty="0">
+                <a:solidFill>
+                  <a:srgbClr val="FF0000"/>
+                </a:solidFill>
+              </a:rPr>
+              <a:t>해당 장소의 위치</a:t>
+            </a:r>
+            <a:r>
+              <a:rPr lang="en-US" altLang="ko-KR" sz="1200" dirty="0">
+                <a:solidFill>
+                  <a:srgbClr val="FF0000"/>
+                </a:solidFill>
+              </a:rPr>
+              <a:t>, </a:t>
+            </a:r>
+            <a:r>
+              <a:rPr lang="ko-KR" altLang="en-US" sz="1200" dirty="0">
+                <a:solidFill>
+                  <a:srgbClr val="FF0000"/>
+                </a:solidFill>
+              </a:rPr>
+              <a:t>전화번호 등 기본 정보</a:t>
+            </a:r>
+            <a:endParaRPr lang="en-US" altLang="ko-KR" sz="1200" dirty="0">
+              <a:solidFill>
+                <a:srgbClr val="FF0000"/>
+              </a:solidFill>
+            </a:endParaRPr>
+          </a:p>
+          <a:p>
+            <a:pPr marL="228600" indent="-228600">
+              <a:buAutoNum type="arabicPeriod"/>
+            </a:pPr>
+            <a:endParaRPr lang="en-US" altLang="ko-KR" sz="1200" dirty="0">
+              <a:solidFill>
+                <a:srgbClr val="FF0000"/>
+              </a:solidFill>
+            </a:endParaRPr>
+          </a:p>
+          <a:p>
+            <a:pPr marL="228600" indent="-228600">
+              <a:buAutoNum type="arabicPeriod"/>
+            </a:pPr>
+            <a:r>
+              <a:rPr lang="ko-KR" altLang="en-US" sz="1200" dirty="0" err="1">
+                <a:solidFill>
+                  <a:srgbClr val="FF0000"/>
+                </a:solidFill>
+              </a:rPr>
+              <a:t>구글맵</a:t>
+            </a:r>
+            <a:r>
+              <a:rPr lang="ko-KR" altLang="en-US" sz="1200" dirty="0">
+                <a:solidFill>
+                  <a:srgbClr val="FF0000"/>
+                </a:solidFill>
+              </a:rPr>
+              <a:t> </a:t>
+            </a:r>
+            <a:r>
+              <a:rPr lang="en-US" altLang="ko-KR" sz="1200" dirty="0" err="1">
+                <a:solidFill>
+                  <a:srgbClr val="FF0000"/>
+                </a:solidFill>
+              </a:rPr>
+              <a:t>api</a:t>
+            </a:r>
+            <a:r>
+              <a:rPr lang="ko-KR" altLang="en-US" sz="1200" dirty="0" err="1">
+                <a:solidFill>
+                  <a:srgbClr val="FF0000"/>
+                </a:solidFill>
+              </a:rPr>
+              <a:t>를</a:t>
+            </a:r>
+            <a:r>
+              <a:rPr lang="ko-KR" altLang="en-US" sz="1200" dirty="0">
+                <a:solidFill>
+                  <a:srgbClr val="FF0000"/>
+                </a:solidFill>
+              </a:rPr>
+              <a:t> 이용하여 해당 장소의 위치</a:t>
+            </a:r>
+            <a:endParaRPr lang="en-US" altLang="ko-KR" sz="1200" dirty="0">
+              <a:solidFill>
+                <a:srgbClr val="FF0000"/>
+              </a:solidFill>
+            </a:endParaRPr>
+          </a:p>
+          <a:p>
+            <a:pPr marL="228600" indent="-228600">
+              <a:buAutoNum type="arabicPeriod"/>
+            </a:pPr>
+            <a:endParaRPr lang="en-US" altLang="ko-KR" sz="1200" dirty="0">
+              <a:solidFill>
+                <a:srgbClr val="FF0000"/>
+              </a:solidFill>
+            </a:endParaRPr>
+          </a:p>
+          <a:p>
+            <a:pPr marL="228600" indent="-228600">
+              <a:buAutoNum type="arabicPeriod"/>
+            </a:pPr>
+            <a:endParaRPr lang="en-US" altLang="ko-KR" sz="1200" dirty="0">
+              <a:solidFill>
+                <a:srgbClr val="FF0000"/>
+              </a:solidFill>
+            </a:endParaRPr>
+          </a:p>
+        </p:txBody>
+      </p:sp>
+      <p:pic>
+        <p:nvPicPr>
+          <p:cNvPr id="3" name="그림 2">
+            <a:extLst>
+              <a:ext uri="{FF2B5EF4-FFF2-40B4-BE49-F238E27FC236}">
+                <a16:creationId xmlns:a16="http://schemas.microsoft.com/office/drawing/2014/main" id="{A778C927-505A-41B3-A141-7C99CD90843B}"/>
+              </a:ext>
+            </a:extLst>
+          </p:cNvPr>
+          <p:cNvPicPr>
+            <a:picLocks noChangeAspect="1"/>
+          </p:cNvPicPr>
+          <p:nvPr/>
+        </p:nvPicPr>
+        <p:blipFill>
+          <a:blip r:embed="rId2"/>
+          <a:stretch>
+            <a:fillRect/>
+          </a:stretch>
+        </p:blipFill>
+        <p:spPr>
+          <a:xfrm>
+            <a:off x="4897850" y="1660532"/>
+            <a:ext cx="5371393" cy="4304151"/>
+          </a:xfrm>
+          <a:prstGeom prst="rect">
+            <a:avLst/>
+          </a:prstGeom>
+        </p:spPr>
+      </p:pic>
+      <p:sp>
+        <p:nvSpPr>
+          <p:cNvPr id="13" name="타원 12">
+            <a:extLst>
+              <a:ext uri="{FF2B5EF4-FFF2-40B4-BE49-F238E27FC236}">
+                <a16:creationId xmlns:a16="http://schemas.microsoft.com/office/drawing/2014/main" id="{CD2FD3FE-F3D9-490F-B673-375A167C0610}"/>
+              </a:ext>
+            </a:extLst>
+          </p:cNvPr>
+          <p:cNvSpPr/>
+          <p:nvPr/>
+        </p:nvSpPr>
+        <p:spPr>
+          <a:xfrm>
+            <a:off x="1661598" y="1660532"/>
+            <a:ext cx="395111" cy="268044"/>
+          </a:xfrm>
+          <a:prstGeom prst="ellipse">
+            <a:avLst/>
+          </a:prstGeom>
+          <a:solidFill>
+            <a:srgbClr val="FF0000"/>
+          </a:solidFill>
+        </p:spPr>
+        <p:style>
+          <a:lnRef idx="2">
+            <a:schemeClr val="accent1">
+              <a:shade val="50000"/>
+            </a:schemeClr>
+          </a:lnRef>
+          <a:fillRef idx="1">
+            <a:schemeClr val="accent1"/>
+          </a:fillRef>
+          <a:effectRef idx="0">
+            <a:schemeClr val="accent1"/>
+          </a:effectRef>
+          <a:fontRef idx="minor">
+            <a:schemeClr val="lt1"/>
+          </a:fontRef>
+        </p:style>
+        <p:txBody>
+          <a:bodyPr rtlCol="0" anchor="ctr"/>
+          <a:lstStyle/>
+          <a:p>
+            <a:pPr algn="ctr"/>
+            <a:r>
+              <a:rPr lang="en-US" altLang="ko-KR" dirty="0"/>
+              <a:t>1</a:t>
+            </a:r>
+            <a:endParaRPr lang="ko-KR" altLang="en-US" dirty="0"/>
+          </a:p>
+        </p:txBody>
+      </p:sp>
+      <p:sp>
+        <p:nvSpPr>
+          <p:cNvPr id="14" name="타원 13">
+            <a:extLst>
+              <a:ext uri="{FF2B5EF4-FFF2-40B4-BE49-F238E27FC236}">
+                <a16:creationId xmlns:a16="http://schemas.microsoft.com/office/drawing/2014/main" id="{4E40391D-C0CF-4DFD-BCAA-C767C91A95EA}"/>
+              </a:ext>
+            </a:extLst>
+          </p:cNvPr>
+          <p:cNvSpPr/>
+          <p:nvPr/>
+        </p:nvSpPr>
+        <p:spPr>
+          <a:xfrm>
+            <a:off x="964048" y="3294978"/>
+            <a:ext cx="395111" cy="268044"/>
+          </a:xfrm>
+          <a:prstGeom prst="ellipse">
+            <a:avLst/>
+          </a:prstGeom>
+          <a:solidFill>
+            <a:srgbClr val="FF0000"/>
+          </a:solidFill>
+        </p:spPr>
+        <p:style>
+          <a:lnRef idx="2">
+            <a:schemeClr val="accent1">
+              <a:shade val="50000"/>
+            </a:schemeClr>
+          </a:lnRef>
+          <a:fillRef idx="1">
+            <a:schemeClr val="accent1"/>
+          </a:fillRef>
+          <a:effectRef idx="0">
+            <a:schemeClr val="accent1"/>
+          </a:effectRef>
+          <a:fontRef idx="minor">
+            <a:schemeClr val="lt1"/>
+          </a:fontRef>
+        </p:style>
+        <p:txBody>
+          <a:bodyPr rtlCol="0" anchor="ctr"/>
+          <a:lstStyle/>
+          <a:p>
+            <a:pPr algn="ctr"/>
+            <a:r>
+              <a:rPr lang="en-US" altLang="ko-KR" dirty="0"/>
+              <a:t>2</a:t>
+            </a:r>
+            <a:endParaRPr lang="ko-KR" altLang="en-US" dirty="0"/>
+          </a:p>
+        </p:txBody>
+      </p:sp>
+      <p:sp>
+        <p:nvSpPr>
+          <p:cNvPr id="15" name="타원 14">
+            <a:extLst>
+              <a:ext uri="{FF2B5EF4-FFF2-40B4-BE49-F238E27FC236}">
+                <a16:creationId xmlns:a16="http://schemas.microsoft.com/office/drawing/2014/main" id="{FEDF6159-32FB-4240-95EA-F57399534CCA}"/>
+              </a:ext>
+            </a:extLst>
+          </p:cNvPr>
+          <p:cNvSpPr/>
+          <p:nvPr/>
+        </p:nvSpPr>
+        <p:spPr>
+          <a:xfrm>
+            <a:off x="4836929" y="1517614"/>
+            <a:ext cx="395111" cy="268044"/>
+          </a:xfrm>
+          <a:prstGeom prst="ellipse">
+            <a:avLst/>
+          </a:prstGeom>
+          <a:solidFill>
+            <a:srgbClr val="FF0000"/>
+          </a:solidFill>
+        </p:spPr>
+        <p:style>
+          <a:lnRef idx="2">
+            <a:schemeClr val="accent1">
+              <a:shade val="50000"/>
+            </a:schemeClr>
+          </a:lnRef>
+          <a:fillRef idx="1">
+            <a:schemeClr val="accent1"/>
+          </a:fillRef>
+          <a:effectRef idx="0">
+            <a:schemeClr val="accent1"/>
+          </a:effectRef>
+          <a:fontRef idx="minor">
+            <a:schemeClr val="lt1"/>
+          </a:fontRef>
+        </p:style>
+        <p:txBody>
+          <a:bodyPr rtlCol="0" anchor="ctr"/>
+          <a:lstStyle/>
+          <a:p>
+            <a:pPr algn="ctr"/>
+            <a:r>
+              <a:rPr lang="en-US" altLang="ko-KR" dirty="0"/>
+              <a:t>3</a:t>
+            </a:r>
+            <a:endParaRPr lang="ko-KR" altLang="en-US" dirty="0"/>
+          </a:p>
+        </p:txBody>
+      </p:sp>
+      <p:sp>
+        <p:nvSpPr>
+          <p:cNvPr id="16" name="TextBox 15">
+            <a:extLst>
+              <a:ext uri="{FF2B5EF4-FFF2-40B4-BE49-F238E27FC236}">
+                <a16:creationId xmlns:a16="http://schemas.microsoft.com/office/drawing/2014/main" id="{D079AA9C-67F6-472F-8828-2E4CF16CCB65}"/>
+              </a:ext>
+            </a:extLst>
+          </p:cNvPr>
+          <p:cNvSpPr txBox="1"/>
+          <p:nvPr/>
+        </p:nvSpPr>
+        <p:spPr>
+          <a:xfrm>
+            <a:off x="60412" y="6292734"/>
+            <a:ext cx="1957558" cy="369332"/>
+          </a:xfrm>
+          <a:prstGeom prst="rect">
+            <a:avLst/>
+          </a:prstGeom>
+          <a:solidFill>
+            <a:schemeClr val="bg1"/>
+          </a:solidFill>
+        </p:spPr>
+        <p:txBody>
+          <a:bodyPr wrap="square" rtlCol="0">
+            <a:spAutoFit/>
+          </a:bodyPr>
+          <a:lstStyle/>
+          <a:p>
+            <a:pPr algn="ctr"/>
+            <a:r>
+              <a:rPr lang="en-US" altLang="ko-KR" dirty="0"/>
+              <a:t>“…/…/”</a:t>
+            </a:r>
           </a:p>
         </p:txBody>
       </p:sp>

</xml_diff>